<commit_message>
Presentation for the project 'Minesweeper'
</commit_message>
<xml_diff>
--- a/Презентация.pptx
+++ b/Презентация.pptx
@@ -2,8 +2,17 @@
 <file path=ppt/presentation.xml><?xml version="1.0" encoding="utf-8"?>
 <p:presentation xmlns:a="http://schemas.openxmlformats.org/drawingml/2006/main" xmlns:r="http://schemas.openxmlformats.org/officeDocument/2006/relationships" xmlns:p="http://schemas.openxmlformats.org/presentationml/2006/main" saveSubsetFonts="1">
   <p:sldMasterIdLst>
-    <p:sldMasterId id="2147483648" r:id="rId1"/>
+    <p:sldMasterId id="2147483672" r:id="rId1"/>
   </p:sldMasterIdLst>
+  <p:sldIdLst>
+    <p:sldId id="256" r:id="rId2"/>
+    <p:sldId id="258" r:id="rId3"/>
+    <p:sldId id="259" r:id="rId4"/>
+    <p:sldId id="257" r:id="rId5"/>
+    <p:sldId id="260" r:id="rId6"/>
+    <p:sldId id="261" r:id="rId7"/>
+    <p:sldId id="262" r:id="rId8"/>
+  </p:sldIdLst>
   <p:sldSz cx="9144000" cy="6858000" type="screen4x3"/>
   <p:notesSz cx="6858000" cy="9144000"/>
   <p:defaultTextStyle>
@@ -123,7 +132,7 @@
       </p:grpSpPr>
       <p:sp>
         <p:nvSpPr>
-          <p:cNvPr id="2" name="Заголовок 1"/>
+          <p:cNvPr id="2" name="Title 1"/>
           <p:cNvSpPr>
             <a:spLocks noGrp="1"/>
           </p:cNvSpPr>
@@ -133,25 +142,36 @@
         </p:nvSpPr>
         <p:spPr>
           <a:xfrm>
-            <a:off x="685800" y="2130425"/>
-            <a:ext cx="7772400" cy="1470025"/>
+            <a:off x="685800" y="1905000"/>
+            <a:ext cx="7543800" cy="2593975"/>
           </a:xfrm>
         </p:spPr>
         <p:txBody>
-          <a:bodyPr/>
-          <a:lstStyle/>
+          <a:bodyPr anchor="b"/>
+          <a:lstStyle>
+            <a:lvl1pPr>
+              <a:defRPr sz="6600">
+                <a:ln>
+                  <a:noFill/>
+                </a:ln>
+                <a:solidFill>
+                  <a:schemeClr val="tx2"/>
+                </a:solidFill>
+              </a:defRPr>
+            </a:lvl1pPr>
+          </a:lstStyle>
           <a:p>
             <a:r>
               <a:rPr lang="ru-RU" smtClean="0"/>
               <a:t>Образец заголовка</a:t>
             </a:r>
-            <a:endParaRPr lang="ru-RU"/>
-          </a:p>
-        </p:txBody>
-      </p:sp>
-      <p:sp>
-        <p:nvSpPr>
-          <p:cNvPr id="3" name="Подзаголовок 2"/>
+            <a:endParaRPr lang="en-US" dirty="0"/>
+          </a:p>
+        </p:txBody>
+      </p:sp>
+      <p:sp>
+        <p:nvSpPr>
+          <p:cNvPr id="3" name="Subtitle 2"/>
           <p:cNvSpPr>
             <a:spLocks noGrp="1"/>
           </p:cNvSpPr>
@@ -161,16 +181,18 @@
         </p:nvSpPr>
         <p:spPr>
           <a:xfrm>
-            <a:off x="1371600" y="3886200"/>
-            <a:ext cx="6400800" cy="1752600"/>
+            <a:off x="685800" y="4572000"/>
+            <a:ext cx="6461760" cy="1066800"/>
           </a:xfrm>
         </p:spPr>
         <p:txBody>
-          <a:bodyPr/>
+          <a:bodyPr anchor="t">
+            <a:normAutofit/>
+          </a:bodyPr>
           <a:lstStyle>
-            <a:lvl1pPr marL="0" indent="0" algn="ctr">
-              <a:buNone/>
-              <a:defRPr>
+            <a:lvl1pPr marL="0" indent="0" algn="l">
+              <a:buNone/>
+              <a:defRPr sz="2000">
                 <a:solidFill>
                   <a:schemeClr val="tx1">
                     <a:tint val="75000"/>
@@ -264,13 +286,13 @@
               <a:rPr lang="ru-RU" smtClean="0"/>
               <a:t>Образец подзаголовка</a:t>
             </a:r>
-            <a:endParaRPr lang="ru-RU"/>
-          </a:p>
-        </p:txBody>
-      </p:sp>
-      <p:sp>
-        <p:nvSpPr>
-          <p:cNvPr id="4" name="Дата 3"/>
+            <a:endParaRPr lang="en-US" dirty="0"/>
+          </a:p>
+        </p:txBody>
+      </p:sp>
+      <p:sp>
+        <p:nvSpPr>
+          <p:cNvPr id="4" name="Date Placeholder 3"/>
           <p:cNvSpPr>
             <a:spLocks noGrp="1"/>
           </p:cNvSpPr>
@@ -285,7 +307,7 @@
           <a:p>
             <a:fld id="{B4C71EC6-210F-42DE-9C53-41977AD35B3D}" type="datetimeFigureOut">
               <a:rPr lang="ru-RU" smtClean="0"/>
-              <a:t>12.11.2009</a:t>
+              <a:t>26.02.2020</a:t>
             </a:fld>
             <a:endParaRPr lang="ru-RU"/>
           </a:p>
@@ -293,7 +315,7 @@
       </p:sp>
       <p:sp>
         <p:nvSpPr>
-          <p:cNvPr id="5" name="Нижний колонтитул 4"/>
+          <p:cNvPr id="5" name="Footer Placeholder 4"/>
           <p:cNvSpPr>
             <a:spLocks noGrp="1"/>
           </p:cNvSpPr>
@@ -312,7 +334,7 @@
       </p:sp>
       <p:sp>
         <p:nvSpPr>
-          <p:cNvPr id="6" name="Номер слайда 5"/>
+          <p:cNvPr id="6" name="Slide Number Placeholder 5"/>
           <p:cNvSpPr>
             <a:spLocks noGrp="1"/>
           </p:cNvSpPr>
@@ -360,7 +382,7 @@
       </p:grpSpPr>
       <p:sp>
         <p:nvSpPr>
-          <p:cNvPr id="2" name="Заголовок 1"/>
+          <p:cNvPr id="2" name="Title 1"/>
           <p:cNvSpPr>
             <a:spLocks noGrp="1"/>
           </p:cNvSpPr>
@@ -377,13 +399,13 @@
               <a:rPr lang="ru-RU" smtClean="0"/>
               <a:t>Образец заголовка</a:t>
             </a:r>
-            <a:endParaRPr lang="ru-RU"/>
-          </a:p>
-        </p:txBody>
-      </p:sp>
-      <p:sp>
-        <p:nvSpPr>
-          <p:cNvPr id="3" name="Вертикальный текст 2"/>
+            <a:endParaRPr lang="en-US"/>
+          </a:p>
+        </p:txBody>
+      </p:sp>
+      <p:sp>
+        <p:nvSpPr>
+          <p:cNvPr id="3" name="Vertical Text Placeholder 2"/>
           <p:cNvSpPr>
             <a:spLocks noGrp="1"/>
           </p:cNvSpPr>
@@ -429,13 +451,13 @@
               <a:rPr lang="ru-RU" smtClean="0"/>
               <a:t>Пятый уровень</a:t>
             </a:r>
-            <a:endParaRPr lang="ru-RU"/>
-          </a:p>
-        </p:txBody>
-      </p:sp>
-      <p:sp>
-        <p:nvSpPr>
-          <p:cNvPr id="4" name="Дата 3"/>
+            <a:endParaRPr lang="en-US"/>
+          </a:p>
+        </p:txBody>
+      </p:sp>
+      <p:sp>
+        <p:nvSpPr>
+          <p:cNvPr id="4" name="Date Placeholder 3"/>
           <p:cNvSpPr>
             <a:spLocks noGrp="1"/>
           </p:cNvSpPr>
@@ -450,7 +472,7 @@
           <a:p>
             <a:fld id="{B4C71EC6-210F-42DE-9C53-41977AD35B3D}" type="datetimeFigureOut">
               <a:rPr lang="ru-RU" smtClean="0"/>
-              <a:t>12.11.2009</a:t>
+              <a:t>26.02.2020</a:t>
             </a:fld>
             <a:endParaRPr lang="ru-RU"/>
           </a:p>
@@ -458,7 +480,7 @@
       </p:sp>
       <p:sp>
         <p:nvSpPr>
-          <p:cNvPr id="5" name="Нижний колонтитул 4"/>
+          <p:cNvPr id="5" name="Footer Placeholder 4"/>
           <p:cNvSpPr>
             <a:spLocks noGrp="1"/>
           </p:cNvSpPr>
@@ -477,7 +499,7 @@
       </p:sp>
       <p:sp>
         <p:nvSpPr>
-          <p:cNvPr id="6" name="Номер слайда 5"/>
+          <p:cNvPr id="6" name="Slide Number Placeholder 5"/>
           <p:cNvSpPr>
             <a:spLocks noGrp="1"/>
           </p:cNvSpPr>
@@ -525,7 +547,7 @@
       </p:grpSpPr>
       <p:sp>
         <p:nvSpPr>
-          <p:cNvPr id="2" name="Вертикальный заголовок 1"/>
+          <p:cNvPr id="2" name="Vertical Title 1"/>
           <p:cNvSpPr>
             <a:spLocks noGrp="1"/>
           </p:cNvSpPr>
@@ -536,24 +558,24 @@
         <p:spPr>
           <a:xfrm>
             <a:off x="6629400" y="274638"/>
-            <a:ext cx="2057400" cy="5851525"/>
+            <a:ext cx="1752600" cy="5851525"/>
           </a:xfrm>
         </p:spPr>
         <p:txBody>
-          <a:bodyPr vert="eaVert"/>
+          <a:bodyPr vert="eaVert" anchor="b" anchorCtr="0"/>
           <a:lstStyle/>
           <a:p>
             <a:r>
               <a:rPr lang="ru-RU" smtClean="0"/>
               <a:t>Образец заголовка</a:t>
             </a:r>
-            <a:endParaRPr lang="ru-RU"/>
-          </a:p>
-        </p:txBody>
-      </p:sp>
-      <p:sp>
-        <p:nvSpPr>
-          <p:cNvPr id="3" name="Вертикальный текст 2"/>
+            <a:endParaRPr lang="en-US" dirty="0"/>
+          </a:p>
+        </p:txBody>
+      </p:sp>
+      <p:sp>
+        <p:nvSpPr>
+          <p:cNvPr id="3" name="Vertical Text Placeholder 2"/>
           <p:cNvSpPr>
             <a:spLocks noGrp="1"/>
           </p:cNvSpPr>
@@ -604,13 +626,13 @@
               <a:rPr lang="ru-RU" smtClean="0"/>
               <a:t>Пятый уровень</a:t>
             </a:r>
-            <a:endParaRPr lang="ru-RU"/>
-          </a:p>
-        </p:txBody>
-      </p:sp>
-      <p:sp>
-        <p:nvSpPr>
-          <p:cNvPr id="4" name="Дата 3"/>
+            <a:endParaRPr lang="en-US"/>
+          </a:p>
+        </p:txBody>
+      </p:sp>
+      <p:sp>
+        <p:nvSpPr>
+          <p:cNvPr id="4" name="Date Placeholder 3"/>
           <p:cNvSpPr>
             <a:spLocks noGrp="1"/>
           </p:cNvSpPr>
@@ -625,7 +647,7 @@
           <a:p>
             <a:fld id="{B4C71EC6-210F-42DE-9C53-41977AD35B3D}" type="datetimeFigureOut">
               <a:rPr lang="ru-RU" smtClean="0"/>
-              <a:t>12.11.2009</a:t>
+              <a:t>26.02.2020</a:t>
             </a:fld>
             <a:endParaRPr lang="ru-RU"/>
           </a:p>
@@ -633,7 +655,7 @@
       </p:sp>
       <p:sp>
         <p:nvSpPr>
-          <p:cNvPr id="5" name="Нижний колонтитул 4"/>
+          <p:cNvPr id="5" name="Footer Placeholder 4"/>
           <p:cNvSpPr>
             <a:spLocks noGrp="1"/>
           </p:cNvSpPr>
@@ -652,7 +674,7 @@
       </p:sp>
       <p:sp>
         <p:nvSpPr>
-          <p:cNvPr id="6" name="Номер слайда 5"/>
+          <p:cNvPr id="6" name="Slide Number Placeholder 5"/>
           <p:cNvSpPr>
             <a:spLocks noGrp="1"/>
           </p:cNvSpPr>
@@ -700,7 +722,7 @@
       </p:grpSpPr>
       <p:sp>
         <p:nvSpPr>
-          <p:cNvPr id="2" name="Заголовок 1"/>
+          <p:cNvPr id="2" name="Title 1"/>
           <p:cNvSpPr>
             <a:spLocks noGrp="1"/>
           </p:cNvSpPr>
@@ -717,13 +739,13 @@
               <a:rPr lang="ru-RU" smtClean="0"/>
               <a:t>Образец заголовка</a:t>
             </a:r>
-            <a:endParaRPr lang="ru-RU"/>
-          </a:p>
-        </p:txBody>
-      </p:sp>
-      <p:sp>
-        <p:nvSpPr>
-          <p:cNvPr id="3" name="Содержимое 2"/>
+            <a:endParaRPr lang="en-US"/>
+          </a:p>
+        </p:txBody>
+      </p:sp>
+      <p:sp>
+        <p:nvSpPr>
+          <p:cNvPr id="3" name="Content Placeholder 2"/>
           <p:cNvSpPr>
             <a:spLocks noGrp="1"/>
           </p:cNvSpPr>
@@ -769,13 +791,13 @@
               <a:rPr lang="ru-RU" smtClean="0"/>
               <a:t>Пятый уровень</a:t>
             </a:r>
-            <a:endParaRPr lang="ru-RU"/>
-          </a:p>
-        </p:txBody>
-      </p:sp>
-      <p:sp>
-        <p:nvSpPr>
-          <p:cNvPr id="4" name="Дата 3"/>
+            <a:endParaRPr lang="en-US"/>
+          </a:p>
+        </p:txBody>
+      </p:sp>
+      <p:sp>
+        <p:nvSpPr>
+          <p:cNvPr id="4" name="Date Placeholder 3"/>
           <p:cNvSpPr>
             <a:spLocks noGrp="1"/>
           </p:cNvSpPr>
@@ -790,7 +812,7 @@
           <a:p>
             <a:fld id="{B4C71EC6-210F-42DE-9C53-41977AD35B3D}" type="datetimeFigureOut">
               <a:rPr lang="ru-RU" smtClean="0"/>
-              <a:t>12.11.2009</a:t>
+              <a:t>26.02.2020</a:t>
             </a:fld>
             <a:endParaRPr lang="ru-RU"/>
           </a:p>
@@ -798,7 +820,7 @@
       </p:sp>
       <p:sp>
         <p:nvSpPr>
-          <p:cNvPr id="5" name="Нижний колонтитул 4"/>
+          <p:cNvPr id="5" name="Footer Placeholder 4"/>
           <p:cNvSpPr>
             <a:spLocks noGrp="1"/>
           </p:cNvSpPr>
@@ -817,7 +839,7 @@
       </p:sp>
       <p:sp>
         <p:nvSpPr>
-          <p:cNvPr id="6" name="Номер слайда 5"/>
+          <p:cNvPr id="6" name="Slide Number Placeholder 5"/>
           <p:cNvSpPr>
             <a:spLocks noGrp="1"/>
           </p:cNvSpPr>
@@ -865,7 +887,7 @@
       </p:grpSpPr>
       <p:sp>
         <p:nvSpPr>
-          <p:cNvPr id="2" name="Заголовок 1"/>
+          <p:cNvPr id="2" name="Title 1"/>
           <p:cNvSpPr>
             <a:spLocks noGrp="1"/>
           </p:cNvSpPr>
@@ -875,15 +897,15 @@
         </p:nvSpPr>
         <p:spPr>
           <a:xfrm>
-            <a:off x="722313" y="4406900"/>
-            <a:ext cx="7772400" cy="1362075"/>
+            <a:off x="722313" y="5486400"/>
+            <a:ext cx="7659687" cy="1168400"/>
           </a:xfrm>
         </p:spPr>
         <p:txBody>
           <a:bodyPr anchor="t"/>
           <a:lstStyle>
             <a:lvl1pPr algn="l">
-              <a:defRPr sz="4000" b="1" cap="all"/>
+              <a:defRPr sz="3600" b="0" cap="all"/>
             </a:lvl1pPr>
           </a:lstStyle>
           <a:p>
@@ -891,13 +913,13 @@
               <a:rPr lang="ru-RU" smtClean="0"/>
               <a:t>Образец заголовка</a:t>
             </a:r>
-            <a:endParaRPr lang="ru-RU"/>
-          </a:p>
-        </p:txBody>
-      </p:sp>
-      <p:sp>
-        <p:nvSpPr>
-          <p:cNvPr id="3" name="Текст 2"/>
+            <a:endParaRPr lang="en-US" dirty="0"/>
+          </a:p>
+        </p:txBody>
+      </p:sp>
+      <p:sp>
+        <p:nvSpPr>
+          <p:cNvPr id="3" name="Text Placeholder 2"/>
           <p:cNvSpPr>
             <a:spLocks noGrp="1"/>
           </p:cNvSpPr>
@@ -907,8 +929,8 @@
         </p:nvSpPr>
         <p:spPr>
           <a:xfrm>
-            <a:off x="722313" y="2906713"/>
-            <a:ext cx="7772400" cy="1500187"/>
+            <a:off x="722313" y="3852863"/>
+            <a:ext cx="6135687" cy="1633538"/>
           </a:xfrm>
         </p:spPr>
         <p:txBody>
@@ -1016,7 +1038,7 @@
       </p:sp>
       <p:sp>
         <p:nvSpPr>
-          <p:cNvPr id="4" name="Дата 3"/>
+          <p:cNvPr id="4" name="Date Placeholder 3"/>
           <p:cNvSpPr>
             <a:spLocks noGrp="1"/>
           </p:cNvSpPr>
@@ -1031,7 +1053,7 @@
           <a:p>
             <a:fld id="{B4C71EC6-210F-42DE-9C53-41977AD35B3D}" type="datetimeFigureOut">
               <a:rPr lang="ru-RU" smtClean="0"/>
-              <a:t>12.11.2009</a:t>
+              <a:t>26.02.2020</a:t>
             </a:fld>
             <a:endParaRPr lang="ru-RU"/>
           </a:p>
@@ -1039,7 +1061,7 @@
       </p:sp>
       <p:sp>
         <p:nvSpPr>
-          <p:cNvPr id="5" name="Нижний колонтитул 4"/>
+          <p:cNvPr id="5" name="Footer Placeholder 4"/>
           <p:cNvSpPr>
             <a:spLocks noGrp="1"/>
           </p:cNvSpPr>
@@ -1058,7 +1080,7 @@
       </p:sp>
       <p:sp>
         <p:nvSpPr>
-          <p:cNvPr id="6" name="Номер слайда 5"/>
+          <p:cNvPr id="6" name="Slide Number Placeholder 5"/>
           <p:cNvSpPr>
             <a:spLocks noGrp="1"/>
           </p:cNvSpPr>
@@ -1106,7 +1128,7 @@
       </p:grpSpPr>
       <p:sp>
         <p:nvSpPr>
-          <p:cNvPr id="2" name="Заголовок 1"/>
+          <p:cNvPr id="2" name="Title 1"/>
           <p:cNvSpPr>
             <a:spLocks noGrp="1"/>
           </p:cNvSpPr>
@@ -1123,13 +1145,13 @@
               <a:rPr lang="ru-RU" smtClean="0"/>
               <a:t>Образец заголовка</a:t>
             </a:r>
-            <a:endParaRPr lang="ru-RU"/>
-          </a:p>
-        </p:txBody>
-      </p:sp>
-      <p:sp>
-        <p:nvSpPr>
-          <p:cNvPr id="3" name="Содержимое 2"/>
+            <a:endParaRPr lang="en-US"/>
+          </a:p>
+        </p:txBody>
+      </p:sp>
+      <p:sp>
+        <p:nvSpPr>
+          <p:cNvPr id="3" name="Content Placeholder 2"/>
           <p:cNvSpPr>
             <a:spLocks noGrp="1"/>
           </p:cNvSpPr>
@@ -1139,8 +1161,8 @@
         </p:nvSpPr>
         <p:spPr>
           <a:xfrm>
-            <a:off x="457200" y="1600200"/>
-            <a:ext cx="4038600" cy="4525963"/>
+            <a:off x="457200" y="1536192"/>
+            <a:ext cx="3657600" cy="4590288"/>
           </a:xfrm>
         </p:spPr>
         <p:txBody>
@@ -1208,13 +1230,13 @@
               <a:rPr lang="ru-RU" smtClean="0"/>
               <a:t>Пятый уровень</a:t>
             </a:r>
-            <a:endParaRPr lang="ru-RU"/>
-          </a:p>
-        </p:txBody>
-      </p:sp>
-      <p:sp>
-        <p:nvSpPr>
-          <p:cNvPr id="4" name="Содержимое 3"/>
+            <a:endParaRPr lang="en-US" dirty="0"/>
+          </a:p>
+        </p:txBody>
+      </p:sp>
+      <p:sp>
+        <p:nvSpPr>
+          <p:cNvPr id="4" name="Content Placeholder 3"/>
           <p:cNvSpPr>
             <a:spLocks noGrp="1"/>
           </p:cNvSpPr>
@@ -1224,8 +1246,8 @@
         </p:nvSpPr>
         <p:spPr>
           <a:xfrm>
-            <a:off x="4648200" y="1600200"/>
-            <a:ext cx="4038600" cy="4525963"/>
+            <a:off x="4419600" y="1536192"/>
+            <a:ext cx="3657600" cy="4590288"/>
           </a:xfrm>
         </p:spPr>
         <p:txBody>
@@ -1293,13 +1315,13 @@
               <a:rPr lang="ru-RU" smtClean="0"/>
               <a:t>Пятый уровень</a:t>
             </a:r>
-            <a:endParaRPr lang="ru-RU"/>
-          </a:p>
-        </p:txBody>
-      </p:sp>
-      <p:sp>
-        <p:nvSpPr>
-          <p:cNvPr id="5" name="Дата 4"/>
+            <a:endParaRPr lang="en-US" dirty="0"/>
+          </a:p>
+        </p:txBody>
+      </p:sp>
+      <p:sp>
+        <p:nvSpPr>
+          <p:cNvPr id="5" name="Date Placeholder 4"/>
           <p:cNvSpPr>
             <a:spLocks noGrp="1"/>
           </p:cNvSpPr>
@@ -1314,7 +1336,7 @@
           <a:p>
             <a:fld id="{B4C71EC6-210F-42DE-9C53-41977AD35B3D}" type="datetimeFigureOut">
               <a:rPr lang="ru-RU" smtClean="0"/>
-              <a:t>12.11.2009</a:t>
+              <a:t>26.02.2020</a:t>
             </a:fld>
             <a:endParaRPr lang="ru-RU"/>
           </a:p>
@@ -1322,7 +1344,7 @@
       </p:sp>
       <p:sp>
         <p:nvSpPr>
-          <p:cNvPr id="6" name="Нижний колонтитул 5"/>
+          <p:cNvPr id="6" name="Footer Placeholder 5"/>
           <p:cNvSpPr>
             <a:spLocks noGrp="1"/>
           </p:cNvSpPr>
@@ -1341,7 +1363,7 @@
       </p:sp>
       <p:sp>
         <p:nvSpPr>
-          <p:cNvPr id="7" name="Номер слайда 6"/>
+          <p:cNvPr id="7" name="Slide Number Placeholder 6"/>
           <p:cNvSpPr>
             <a:spLocks noGrp="1"/>
           </p:cNvSpPr>
@@ -1389,7 +1411,7 @@
       </p:grpSpPr>
       <p:sp>
         <p:nvSpPr>
-          <p:cNvPr id="2" name="Заголовок 1"/>
+          <p:cNvPr id="2" name="Title 1"/>
           <p:cNvSpPr>
             <a:spLocks noGrp="1"/>
           </p:cNvSpPr>
@@ -1410,13 +1432,13 @@
               <a:rPr lang="ru-RU" smtClean="0"/>
               <a:t>Образец заголовка</a:t>
             </a:r>
-            <a:endParaRPr lang="ru-RU"/>
-          </a:p>
-        </p:txBody>
-      </p:sp>
-      <p:sp>
-        <p:nvSpPr>
-          <p:cNvPr id="3" name="Текст 2"/>
+            <a:endParaRPr lang="en-US"/>
+          </a:p>
+        </p:txBody>
+      </p:sp>
+      <p:sp>
+        <p:nvSpPr>
+          <p:cNvPr id="3" name="Text Placeholder 2"/>
           <p:cNvSpPr>
             <a:spLocks noGrp="1"/>
           </p:cNvSpPr>
@@ -1427,15 +1449,21 @@
         <p:spPr>
           <a:xfrm>
             <a:off x="457200" y="1535113"/>
-            <a:ext cx="4040188" cy="639762"/>
+            <a:ext cx="3657600" cy="639762"/>
           </a:xfrm>
         </p:spPr>
         <p:txBody>
-          <a:bodyPr anchor="b"/>
+          <a:bodyPr anchor="b">
+            <a:noAutofit/>
+          </a:bodyPr>
           <a:lstStyle>
-            <a:lvl1pPr marL="0" indent="0">
-              <a:buNone/>
-              <a:defRPr sz="2400" b="1"/>
+            <a:lvl1pPr marL="0" indent="0" algn="ctr">
+              <a:buNone/>
+              <a:defRPr sz="2000" b="1">
+                <a:solidFill>
+                  <a:schemeClr val="tx2"/>
+                </a:solidFill>
+              </a:defRPr>
             </a:lvl1pPr>
             <a:lvl2pPr marL="457200" indent="0">
               <a:buNone/>
@@ -1481,7 +1509,7 @@
       </p:sp>
       <p:sp>
         <p:nvSpPr>
-          <p:cNvPr id="4" name="Содержимое 3"/>
+          <p:cNvPr id="4" name="Content Placeholder 3"/>
           <p:cNvSpPr>
             <a:spLocks noGrp="1"/>
           </p:cNvSpPr>
@@ -1492,7 +1520,7 @@
         <p:spPr>
           <a:xfrm>
             <a:off x="457200" y="2174875"/>
-            <a:ext cx="4040188" cy="3951288"/>
+            <a:ext cx="3657600" cy="3951288"/>
           </a:xfrm>
         </p:spPr>
         <p:txBody>
@@ -1560,13 +1588,13 @@
               <a:rPr lang="ru-RU" smtClean="0"/>
               <a:t>Пятый уровень</a:t>
             </a:r>
-            <a:endParaRPr lang="ru-RU"/>
-          </a:p>
-        </p:txBody>
-      </p:sp>
-      <p:sp>
-        <p:nvSpPr>
-          <p:cNvPr id="5" name="Текст 4"/>
+            <a:endParaRPr lang="en-US" dirty="0"/>
+          </a:p>
+        </p:txBody>
+      </p:sp>
+      <p:sp>
+        <p:nvSpPr>
+          <p:cNvPr id="5" name="Text Placeholder 4"/>
           <p:cNvSpPr>
             <a:spLocks noGrp="1"/>
           </p:cNvSpPr>
@@ -1576,16 +1604,22 @@
         </p:nvSpPr>
         <p:spPr>
           <a:xfrm>
-            <a:off x="4645025" y="1535113"/>
-            <a:ext cx="4041775" cy="639762"/>
+            <a:off x="4419600" y="1535113"/>
+            <a:ext cx="3657600" cy="639762"/>
           </a:xfrm>
         </p:spPr>
         <p:txBody>
-          <a:bodyPr anchor="b"/>
+          <a:bodyPr anchor="b">
+            <a:noAutofit/>
+          </a:bodyPr>
           <a:lstStyle>
-            <a:lvl1pPr marL="0" indent="0">
-              <a:buNone/>
-              <a:defRPr sz="2400" b="1"/>
+            <a:lvl1pPr marL="0" indent="0" algn="ctr">
+              <a:buNone/>
+              <a:defRPr sz="2000" b="1">
+                <a:solidFill>
+                  <a:schemeClr val="tx2"/>
+                </a:solidFill>
+              </a:defRPr>
             </a:lvl1pPr>
             <a:lvl2pPr marL="457200" indent="0">
               <a:buNone/>
@@ -1631,7 +1665,7 @@
       </p:sp>
       <p:sp>
         <p:nvSpPr>
-          <p:cNvPr id="6" name="Содержимое 5"/>
+          <p:cNvPr id="6" name="Content Placeholder 5"/>
           <p:cNvSpPr>
             <a:spLocks noGrp="1"/>
           </p:cNvSpPr>
@@ -1641,8 +1675,8 @@
         </p:nvSpPr>
         <p:spPr>
           <a:xfrm>
-            <a:off x="4645025" y="2174875"/>
-            <a:ext cx="4041775" cy="3951288"/>
+            <a:off x="4419600" y="2174875"/>
+            <a:ext cx="3657600" cy="3951288"/>
           </a:xfrm>
         </p:spPr>
         <p:txBody>
@@ -1710,13 +1744,13 @@
               <a:rPr lang="ru-RU" smtClean="0"/>
               <a:t>Пятый уровень</a:t>
             </a:r>
-            <a:endParaRPr lang="ru-RU"/>
-          </a:p>
-        </p:txBody>
-      </p:sp>
-      <p:sp>
-        <p:nvSpPr>
-          <p:cNvPr id="7" name="Дата 6"/>
+            <a:endParaRPr lang="en-US"/>
+          </a:p>
+        </p:txBody>
+      </p:sp>
+      <p:sp>
+        <p:nvSpPr>
+          <p:cNvPr id="7" name="Date Placeholder 6"/>
           <p:cNvSpPr>
             <a:spLocks noGrp="1"/>
           </p:cNvSpPr>
@@ -1731,7 +1765,7 @@
           <a:p>
             <a:fld id="{B4C71EC6-210F-42DE-9C53-41977AD35B3D}" type="datetimeFigureOut">
               <a:rPr lang="ru-RU" smtClean="0"/>
-              <a:t>12.11.2009</a:t>
+              <a:t>26.02.2020</a:t>
             </a:fld>
             <a:endParaRPr lang="ru-RU"/>
           </a:p>
@@ -1739,7 +1773,7 @@
       </p:sp>
       <p:sp>
         <p:nvSpPr>
-          <p:cNvPr id="8" name="Нижний колонтитул 7"/>
+          <p:cNvPr id="8" name="Footer Placeholder 7"/>
           <p:cNvSpPr>
             <a:spLocks noGrp="1"/>
           </p:cNvSpPr>
@@ -1758,7 +1792,7 @@
       </p:sp>
       <p:sp>
         <p:nvSpPr>
-          <p:cNvPr id="9" name="Номер слайда 8"/>
+          <p:cNvPr id="9" name="Slide Number Placeholder 8"/>
           <p:cNvSpPr>
             <a:spLocks noGrp="1"/>
           </p:cNvSpPr>
@@ -1806,7 +1840,7 @@
       </p:grpSpPr>
       <p:sp>
         <p:nvSpPr>
-          <p:cNvPr id="2" name="Заголовок 1"/>
+          <p:cNvPr id="2" name="Title 1"/>
           <p:cNvSpPr>
             <a:spLocks noGrp="1"/>
           </p:cNvSpPr>
@@ -1823,13 +1857,13 @@
               <a:rPr lang="ru-RU" smtClean="0"/>
               <a:t>Образец заголовка</a:t>
             </a:r>
-            <a:endParaRPr lang="ru-RU"/>
-          </a:p>
-        </p:txBody>
-      </p:sp>
-      <p:sp>
-        <p:nvSpPr>
-          <p:cNvPr id="3" name="Дата 2"/>
+            <a:endParaRPr lang="en-US"/>
+          </a:p>
+        </p:txBody>
+      </p:sp>
+      <p:sp>
+        <p:nvSpPr>
+          <p:cNvPr id="3" name="Date Placeholder 2"/>
           <p:cNvSpPr>
             <a:spLocks noGrp="1"/>
           </p:cNvSpPr>
@@ -1844,7 +1878,7 @@
           <a:p>
             <a:fld id="{B4C71EC6-210F-42DE-9C53-41977AD35B3D}" type="datetimeFigureOut">
               <a:rPr lang="ru-RU" smtClean="0"/>
-              <a:t>12.11.2009</a:t>
+              <a:t>26.02.2020</a:t>
             </a:fld>
             <a:endParaRPr lang="ru-RU"/>
           </a:p>
@@ -1852,7 +1886,7 @@
       </p:sp>
       <p:sp>
         <p:nvSpPr>
-          <p:cNvPr id="4" name="Нижний колонтитул 3"/>
+          <p:cNvPr id="4" name="Footer Placeholder 3"/>
           <p:cNvSpPr>
             <a:spLocks noGrp="1"/>
           </p:cNvSpPr>
@@ -1871,7 +1905,7 @@
       </p:sp>
       <p:sp>
         <p:nvSpPr>
-          <p:cNvPr id="5" name="Номер слайда 4"/>
+          <p:cNvPr id="5" name="Slide Number Placeholder 4"/>
           <p:cNvSpPr>
             <a:spLocks noGrp="1"/>
           </p:cNvSpPr>
@@ -1919,7 +1953,7 @@
       </p:grpSpPr>
       <p:sp>
         <p:nvSpPr>
-          <p:cNvPr id="2" name="Дата 1"/>
+          <p:cNvPr id="2" name="Date Placeholder 1"/>
           <p:cNvSpPr>
             <a:spLocks noGrp="1"/>
           </p:cNvSpPr>
@@ -1934,7 +1968,7 @@
           <a:p>
             <a:fld id="{B4C71EC6-210F-42DE-9C53-41977AD35B3D}" type="datetimeFigureOut">
               <a:rPr lang="ru-RU" smtClean="0"/>
-              <a:t>12.11.2009</a:t>
+              <a:t>26.02.2020</a:t>
             </a:fld>
             <a:endParaRPr lang="ru-RU"/>
           </a:p>
@@ -1942,7 +1976,7 @@
       </p:sp>
       <p:sp>
         <p:nvSpPr>
-          <p:cNvPr id="3" name="Нижний колонтитул 2"/>
+          <p:cNvPr id="3" name="Footer Placeholder 2"/>
           <p:cNvSpPr>
             <a:spLocks noGrp="1"/>
           </p:cNvSpPr>
@@ -1961,7 +1995,7 @@
       </p:sp>
       <p:sp>
         <p:nvSpPr>
-          <p:cNvPr id="4" name="Номер слайда 3"/>
+          <p:cNvPr id="4" name="Slide Number Placeholder 3"/>
           <p:cNvSpPr>
             <a:spLocks noGrp="1"/>
           </p:cNvSpPr>
@@ -2009,7 +2043,7 @@
       </p:grpSpPr>
       <p:sp>
         <p:nvSpPr>
-          <p:cNvPr id="2" name="Заголовок 1"/>
+          <p:cNvPr id="2" name="Title 1"/>
           <p:cNvSpPr>
             <a:spLocks noGrp="1"/>
           </p:cNvSpPr>
@@ -2019,15 +2053,15 @@
         </p:nvSpPr>
         <p:spPr>
           <a:xfrm>
-            <a:off x="457200" y="273050"/>
-            <a:ext cx="3008313" cy="1162050"/>
+            <a:off x="304801" y="5495544"/>
+            <a:ext cx="7772400" cy="594360"/>
           </a:xfrm>
         </p:spPr>
         <p:txBody>
           <a:bodyPr anchor="b"/>
           <a:lstStyle>
-            <a:lvl1pPr algn="l">
-              <a:defRPr sz="2000" b="1"/>
+            <a:lvl1pPr algn="ctr">
+              <a:defRPr sz="2200" b="1"/>
             </a:lvl1pPr>
           </a:lstStyle>
           <a:p>
@@ -2035,117 +2069,34 @@
               <a:rPr lang="ru-RU" smtClean="0"/>
               <a:t>Образец заголовка</a:t>
             </a:r>
-            <a:endParaRPr lang="ru-RU"/>
-          </a:p>
-        </p:txBody>
-      </p:sp>
-      <p:sp>
-        <p:nvSpPr>
-          <p:cNvPr id="3" name="Содержимое 2"/>
-          <p:cNvSpPr>
-            <a:spLocks noGrp="1"/>
-          </p:cNvSpPr>
-          <p:nvPr>
-            <p:ph idx="1"/>
+            <a:endParaRPr lang="en-US" dirty="0"/>
+          </a:p>
+        </p:txBody>
+      </p:sp>
+      <p:sp>
+        <p:nvSpPr>
+          <p:cNvPr id="4" name="Text Placeholder 3"/>
+          <p:cNvSpPr>
+            <a:spLocks noGrp="1"/>
+          </p:cNvSpPr>
+          <p:nvPr>
+            <p:ph type="body" sz="half" idx="2"/>
           </p:nvPr>
         </p:nvSpPr>
         <p:spPr>
           <a:xfrm>
-            <a:off x="3575050" y="273050"/>
-            <a:ext cx="5111750" cy="5853113"/>
+            <a:off x="304799" y="6096000"/>
+            <a:ext cx="7772401" cy="609600"/>
           </a:xfrm>
         </p:spPr>
         <p:txBody>
-          <a:bodyPr/>
+          <a:bodyPr>
+            <a:normAutofit/>
+          </a:bodyPr>
           <a:lstStyle>
-            <a:lvl1pPr>
-              <a:defRPr sz="3200"/>
-            </a:lvl1pPr>
-            <a:lvl2pPr>
-              <a:defRPr sz="2800"/>
-            </a:lvl2pPr>
-            <a:lvl3pPr>
-              <a:defRPr sz="2400"/>
-            </a:lvl3pPr>
-            <a:lvl4pPr>
-              <a:defRPr sz="2000"/>
-            </a:lvl4pPr>
-            <a:lvl5pPr>
-              <a:defRPr sz="2000"/>
-            </a:lvl5pPr>
-            <a:lvl6pPr>
-              <a:defRPr sz="2000"/>
-            </a:lvl6pPr>
-            <a:lvl7pPr>
-              <a:defRPr sz="2000"/>
-            </a:lvl7pPr>
-            <a:lvl8pPr>
-              <a:defRPr sz="2000"/>
-            </a:lvl8pPr>
-            <a:lvl9pPr>
-              <a:defRPr sz="2000"/>
-            </a:lvl9pPr>
-          </a:lstStyle>
-          <a:p>
-            <a:pPr lvl="0"/>
-            <a:r>
-              <a:rPr lang="ru-RU" smtClean="0"/>
-              <a:t>Образец текста</a:t>
-            </a:r>
-          </a:p>
-          <a:p>
-            <a:pPr lvl="1"/>
-            <a:r>
-              <a:rPr lang="ru-RU" smtClean="0"/>
-              <a:t>Второй уровень</a:t>
-            </a:r>
-          </a:p>
-          <a:p>
-            <a:pPr lvl="2"/>
-            <a:r>
-              <a:rPr lang="ru-RU" smtClean="0"/>
-              <a:t>Третий уровень</a:t>
-            </a:r>
-          </a:p>
-          <a:p>
-            <a:pPr lvl="3"/>
-            <a:r>
-              <a:rPr lang="ru-RU" smtClean="0"/>
-              <a:t>Четвертый уровень</a:t>
-            </a:r>
-          </a:p>
-          <a:p>
-            <a:pPr lvl="4"/>
-            <a:r>
-              <a:rPr lang="ru-RU" smtClean="0"/>
-              <a:t>Пятый уровень</a:t>
-            </a:r>
-            <a:endParaRPr lang="ru-RU"/>
-          </a:p>
-        </p:txBody>
-      </p:sp>
-      <p:sp>
-        <p:nvSpPr>
-          <p:cNvPr id="4" name="Текст 3"/>
-          <p:cNvSpPr>
-            <a:spLocks noGrp="1"/>
-          </p:cNvSpPr>
-          <p:nvPr>
-            <p:ph type="body" sz="half" idx="2"/>
-          </p:nvPr>
-        </p:nvSpPr>
-        <p:spPr>
-          <a:xfrm>
-            <a:off x="457200" y="1435100"/>
-            <a:ext cx="3008313" cy="4691063"/>
-          </a:xfrm>
-        </p:spPr>
-        <p:txBody>
-          <a:bodyPr/>
-          <a:lstStyle>
-            <a:lvl1pPr marL="0" indent="0">
-              <a:buNone/>
-              <a:defRPr sz="1400"/>
+            <a:lvl1pPr marL="0" indent="0" algn="ctr">
+              <a:buNone/>
+              <a:defRPr sz="1600"/>
             </a:lvl1pPr>
             <a:lvl2pPr marL="457200" indent="0">
               <a:buNone/>
@@ -2191,7 +2142,7 @@
       </p:sp>
       <p:sp>
         <p:nvSpPr>
-          <p:cNvPr id="5" name="Дата 4"/>
+          <p:cNvPr id="5" name="Date Placeholder 4"/>
           <p:cNvSpPr>
             <a:spLocks noGrp="1"/>
           </p:cNvSpPr>
@@ -2206,7 +2157,7 @@
           <a:p>
             <a:fld id="{B4C71EC6-210F-42DE-9C53-41977AD35B3D}" type="datetimeFigureOut">
               <a:rPr lang="ru-RU" smtClean="0"/>
-              <a:t>12.11.2009</a:t>
+              <a:t>26.02.2020</a:t>
             </a:fld>
             <a:endParaRPr lang="ru-RU"/>
           </a:p>
@@ -2214,7 +2165,7 @@
       </p:sp>
       <p:sp>
         <p:nvSpPr>
-          <p:cNvPr id="6" name="Нижний колонтитул 5"/>
+          <p:cNvPr id="6" name="Footer Placeholder 5"/>
           <p:cNvSpPr>
             <a:spLocks noGrp="1"/>
           </p:cNvSpPr>
@@ -2233,7 +2184,7 @@
       </p:sp>
       <p:sp>
         <p:nvSpPr>
-          <p:cNvPr id="7" name="Номер слайда 6"/>
+          <p:cNvPr id="7" name="Slide Number Placeholder 6"/>
           <p:cNvSpPr>
             <a:spLocks noGrp="1"/>
           </p:cNvSpPr>
@@ -2251,6 +2202,63 @@
               <a:t>‹#›</a:t>
             </a:fld>
             <a:endParaRPr lang="ru-RU"/>
+          </a:p>
+        </p:txBody>
+      </p:sp>
+      <p:sp>
+        <p:nvSpPr>
+          <p:cNvPr id="9" name="Content Placeholder 8"/>
+          <p:cNvSpPr>
+            <a:spLocks noGrp="1"/>
+          </p:cNvSpPr>
+          <p:nvPr>
+            <p:ph sz="quarter" idx="13"/>
+          </p:nvPr>
+        </p:nvSpPr>
+        <p:spPr>
+          <a:xfrm>
+            <a:off x="304800" y="381000"/>
+            <a:ext cx="7772400" cy="4942840"/>
+          </a:xfrm>
+        </p:spPr>
+        <p:txBody>
+          <a:bodyPr/>
+          <a:lstStyle/>
+          <a:p>
+            <a:pPr lvl="0"/>
+            <a:r>
+              <a:rPr lang="ru-RU" smtClean="0"/>
+              <a:t>Образец текста</a:t>
+            </a:r>
+          </a:p>
+          <a:p>
+            <a:pPr lvl="1"/>
+            <a:r>
+              <a:rPr lang="ru-RU" smtClean="0"/>
+              <a:t>Второй уровень</a:t>
+            </a:r>
+          </a:p>
+          <a:p>
+            <a:pPr lvl="2"/>
+            <a:r>
+              <a:rPr lang="ru-RU" smtClean="0"/>
+              <a:t>Третий уровень</a:t>
+            </a:r>
+          </a:p>
+          <a:p>
+            <a:pPr lvl="3"/>
+            <a:r>
+              <a:rPr lang="ru-RU" smtClean="0"/>
+              <a:t>Четвертый уровень</a:t>
+            </a:r>
+          </a:p>
+          <a:p>
+            <a:pPr lvl="4"/>
+            <a:r>
+              <a:rPr lang="ru-RU" smtClean="0"/>
+              <a:t>Пятый уровень</a:t>
+            </a:r>
+            <a:endParaRPr lang="en-US"/>
           </a:p>
         </p:txBody>
       </p:sp>
@@ -2281,7 +2289,7 @@
       </p:grpSpPr>
       <p:sp>
         <p:nvSpPr>
-          <p:cNvPr id="2" name="Заголовок 1"/>
+          <p:cNvPr id="2" name="Title 1"/>
           <p:cNvSpPr>
             <a:spLocks noGrp="1"/>
           </p:cNvSpPr>
@@ -2291,15 +2299,22 @@
         </p:nvSpPr>
         <p:spPr>
           <a:xfrm>
-            <a:off x="1792288" y="4800600"/>
-            <a:ext cx="5486400" cy="566738"/>
+            <a:off x="301752" y="5495278"/>
+            <a:ext cx="7772400" cy="594626"/>
           </a:xfrm>
         </p:spPr>
         <p:txBody>
           <a:bodyPr anchor="b"/>
           <a:lstStyle>
-            <a:lvl1pPr algn="l">
-              <a:defRPr sz="2000" b="1"/>
+            <a:lvl1pPr algn="ctr">
+              <a:defRPr sz="2200" b="1">
+                <a:ln>
+                  <a:noFill/>
+                </a:ln>
+                <a:solidFill>
+                  <a:schemeClr val="tx2"/>
+                </a:solidFill>
+              </a:defRPr>
             </a:lvl1pPr>
           </a:lstStyle>
           <a:p>
@@ -2307,13 +2322,13 @@
               <a:rPr lang="ru-RU" smtClean="0"/>
               <a:t>Образец заголовка</a:t>
             </a:r>
-            <a:endParaRPr lang="ru-RU"/>
-          </a:p>
-        </p:txBody>
-      </p:sp>
-      <p:sp>
-        <p:nvSpPr>
-          <p:cNvPr id="3" name="Рисунок 2"/>
+            <a:endParaRPr lang="en-US" dirty="0"/>
+          </a:p>
+        </p:txBody>
+      </p:sp>
+      <p:sp>
+        <p:nvSpPr>
+          <p:cNvPr id="3" name="Picture Placeholder 2"/>
           <p:cNvSpPr>
             <a:spLocks noGrp="1"/>
           </p:cNvSpPr>
@@ -2323,8 +2338,8 @@
         </p:nvSpPr>
         <p:spPr>
           <a:xfrm>
-            <a:off x="1792288" y="612775"/>
-            <a:ext cx="5486400" cy="4114800"/>
+            <a:off x="0" y="0"/>
+            <a:ext cx="8458200" cy="5486400"/>
           </a:xfrm>
         </p:spPr>
         <p:txBody>
@@ -2368,13 +2383,17 @@
             </a:lvl9pPr>
           </a:lstStyle>
           <a:p>
-            <a:endParaRPr lang="ru-RU"/>
-          </a:p>
-        </p:txBody>
-      </p:sp>
-      <p:sp>
-        <p:nvSpPr>
-          <p:cNvPr id="4" name="Текст 3"/>
+            <a:r>
+              <a:rPr lang="ru-RU" smtClean="0"/>
+              <a:t>Вставка рисунка</a:t>
+            </a:r>
+            <a:endParaRPr lang="en-US" dirty="0"/>
+          </a:p>
+        </p:txBody>
+      </p:sp>
+      <p:sp>
+        <p:nvSpPr>
+          <p:cNvPr id="4" name="Text Placeholder 3"/>
           <p:cNvSpPr>
             <a:spLocks noGrp="1"/>
           </p:cNvSpPr>
@@ -2384,16 +2403,18 @@
         </p:nvSpPr>
         <p:spPr>
           <a:xfrm>
-            <a:off x="1792288" y="5367338"/>
-            <a:ext cx="5486400" cy="804862"/>
+            <a:off x="301752" y="6096000"/>
+            <a:ext cx="7772400" cy="612648"/>
           </a:xfrm>
         </p:spPr>
         <p:txBody>
-          <a:bodyPr/>
+          <a:bodyPr>
+            <a:normAutofit/>
+          </a:bodyPr>
           <a:lstStyle>
-            <a:lvl1pPr marL="0" indent="0">
-              <a:buNone/>
-              <a:defRPr sz="1400"/>
+            <a:lvl1pPr marL="0" indent="0" algn="ctr">
+              <a:buNone/>
+              <a:defRPr sz="1600"/>
             </a:lvl1pPr>
             <a:lvl2pPr marL="457200" indent="0">
               <a:buNone/>
@@ -2439,7 +2460,7 @@
       </p:sp>
       <p:sp>
         <p:nvSpPr>
-          <p:cNvPr id="5" name="Дата 4"/>
+          <p:cNvPr id="8" name="Date Placeholder 7"/>
           <p:cNvSpPr>
             <a:spLocks noGrp="1"/>
           </p:cNvSpPr>
@@ -2454,7 +2475,7 @@
           <a:p>
             <a:fld id="{B4C71EC6-210F-42DE-9C53-41977AD35B3D}" type="datetimeFigureOut">
               <a:rPr lang="ru-RU" smtClean="0"/>
-              <a:t>12.11.2009</a:t>
+              <a:t>26.02.2020</a:t>
             </a:fld>
             <a:endParaRPr lang="ru-RU"/>
           </a:p>
@@ -2462,31 +2483,12 @@
       </p:sp>
       <p:sp>
         <p:nvSpPr>
-          <p:cNvPr id="6" name="Нижний колонтитул 5"/>
-          <p:cNvSpPr>
-            <a:spLocks noGrp="1"/>
-          </p:cNvSpPr>
-          <p:nvPr>
-            <p:ph type="ftr" sz="quarter" idx="11"/>
-          </p:nvPr>
-        </p:nvSpPr>
-        <p:spPr/>
-        <p:txBody>
-          <a:bodyPr/>
-          <a:lstStyle/>
-          <a:p>
-            <a:endParaRPr lang="ru-RU"/>
-          </a:p>
-        </p:txBody>
-      </p:sp>
-      <p:sp>
-        <p:nvSpPr>
-          <p:cNvPr id="7" name="Номер слайда 6"/>
-          <p:cNvSpPr>
-            <a:spLocks noGrp="1"/>
-          </p:cNvSpPr>
-          <p:nvPr>
-            <p:ph type="sldNum" sz="quarter" idx="12"/>
+          <p:cNvPr id="9" name="Slide Number Placeholder 8"/>
+          <p:cNvSpPr>
+            <a:spLocks noGrp="1"/>
+          </p:cNvSpPr>
+          <p:nvPr>
+            <p:ph type="sldNum" sz="quarter" idx="11"/>
           </p:nvPr>
         </p:nvSpPr>
         <p:spPr/>
@@ -2498,6 +2500,25 @@
               <a:rPr lang="ru-RU" smtClean="0"/>
               <a:t>‹#›</a:t>
             </a:fld>
+            <a:endParaRPr lang="ru-RU"/>
+          </a:p>
+        </p:txBody>
+      </p:sp>
+      <p:sp>
+        <p:nvSpPr>
+          <p:cNvPr id="10" name="Footer Placeholder 9"/>
+          <p:cNvSpPr>
+            <a:spLocks noGrp="1"/>
+          </p:cNvSpPr>
+          <p:nvPr>
+            <p:ph type="ftr" sz="quarter" idx="12"/>
+          </p:nvPr>
+        </p:nvSpPr>
+        <p:spPr/>
+        <p:txBody>
+          <a:bodyPr/>
+          <a:lstStyle/>
+          <a:p>
             <a:endParaRPr lang="ru-RU"/>
           </a:p>
         </p:txBody>
@@ -2514,7 +2535,7 @@
 <p:sldMaster xmlns:a="http://schemas.openxmlformats.org/drawingml/2006/main" xmlns:r="http://schemas.openxmlformats.org/officeDocument/2006/relationships" xmlns:p="http://schemas.openxmlformats.org/presentationml/2006/main">
   <p:cSld>
     <p:bg>
-      <p:bgRef idx="1001">
+      <p:bgRef idx="1002">
         <a:schemeClr val="bg1"/>
       </p:bgRef>
     </p:bg>
@@ -2534,7 +2555,7 @@
       </p:grpSpPr>
       <p:sp>
         <p:nvSpPr>
-          <p:cNvPr id="2" name="Заголовок 1"/>
+          <p:cNvPr id="2" name="Title Placeholder 1"/>
           <p:cNvSpPr>
             <a:spLocks noGrp="1"/>
           </p:cNvSpPr>
@@ -2545,7 +2566,7 @@
         <p:spPr>
           <a:xfrm>
             <a:off x="457200" y="274638"/>
-            <a:ext cx="8229600" cy="1143000"/>
+            <a:ext cx="7620000" cy="1143000"/>
           </a:xfrm>
           <a:prstGeom prst="rect">
             <a:avLst/>
@@ -2553,7 +2574,7 @@
         </p:spPr>
         <p:txBody>
           <a:bodyPr vert="horz" lIns="91440" tIns="45720" rIns="91440" bIns="45720" rtlCol="0" anchor="ctr">
-            <a:normAutofit/>
+            <a:noAutofit/>
           </a:bodyPr>
           <a:lstStyle/>
           <a:p>
@@ -2561,13 +2582,13 @@
               <a:rPr lang="ru-RU" smtClean="0"/>
               <a:t>Образец заголовка</a:t>
             </a:r>
-            <a:endParaRPr lang="ru-RU"/>
-          </a:p>
-        </p:txBody>
-      </p:sp>
-      <p:sp>
-        <p:nvSpPr>
-          <p:cNvPr id="3" name="Текст 2"/>
+            <a:endParaRPr lang="en-US" dirty="0"/>
+          </a:p>
+        </p:txBody>
+      </p:sp>
+      <p:sp>
+        <p:nvSpPr>
+          <p:cNvPr id="3" name="Text Placeholder 2"/>
           <p:cNvSpPr>
             <a:spLocks noGrp="1"/>
           </p:cNvSpPr>
@@ -2578,7 +2599,7 @@
         <p:spPr>
           <a:xfrm>
             <a:off x="457200" y="1600200"/>
-            <a:ext cx="8229600" cy="4525963"/>
+            <a:ext cx="7620000" cy="4800600"/>
           </a:xfrm>
           <a:prstGeom prst="rect">
             <a:avLst/>
@@ -2623,24 +2644,162 @@
               <a:rPr lang="ru-RU" smtClean="0"/>
               <a:t>Пятый уровень</a:t>
             </a:r>
-            <a:endParaRPr lang="ru-RU"/>
-          </a:p>
-        </p:txBody>
-      </p:sp>
-      <p:sp>
-        <p:nvSpPr>
-          <p:cNvPr id="4" name="Дата 3"/>
-          <p:cNvSpPr>
-            <a:spLocks noGrp="1"/>
-          </p:cNvSpPr>
-          <p:nvPr>
-            <p:ph type="dt" sz="half" idx="2"/>
-          </p:nvPr>
+            <a:endParaRPr lang="en-US" dirty="0"/>
+          </a:p>
+        </p:txBody>
+      </p:sp>
+      <p:sp>
+        <p:nvSpPr>
+          <p:cNvPr id="7" name="Rectangle 6"/>
+          <p:cNvSpPr/>
+          <p:nvPr/>
         </p:nvSpPr>
         <p:spPr>
           <a:xfrm>
-            <a:off x="457200" y="6356350"/>
-            <a:ext cx="2133600" cy="365125"/>
+            <a:off x="8458200" y="0"/>
+            <a:ext cx="685800" cy="6858000"/>
+          </a:xfrm>
+          <a:prstGeom prst="rect">
+            <a:avLst/>
+          </a:prstGeom>
+          <a:solidFill>
+            <a:schemeClr val="tx2"/>
+          </a:solidFill>
+          <a:ln>
+            <a:noFill/>
+          </a:ln>
+        </p:spPr>
+        <p:style>
+          <a:lnRef idx="2">
+            <a:schemeClr val="accent1">
+              <a:shade val="50000"/>
+            </a:schemeClr>
+          </a:lnRef>
+          <a:fillRef idx="1">
+            <a:schemeClr val="accent1"/>
+          </a:fillRef>
+          <a:effectRef idx="0">
+            <a:schemeClr val="accent1"/>
+          </a:effectRef>
+          <a:fontRef idx="minor">
+            <a:schemeClr val="lt1"/>
+          </a:fontRef>
+        </p:style>
+        <p:txBody>
+          <a:bodyPr rtlCol="0" anchor="ctr"/>
+          <a:lstStyle/>
+          <a:p>
+            <a:pPr algn="ctr"/>
+            <a:endParaRPr lang="en-US"/>
+          </a:p>
+        </p:txBody>
+      </p:sp>
+      <p:sp>
+        <p:nvSpPr>
+          <p:cNvPr id="8" name="Rectangle 7"/>
+          <p:cNvSpPr/>
+          <p:nvPr/>
+        </p:nvSpPr>
+        <p:spPr>
+          <a:xfrm>
+            <a:off x="8458200" y="5486400"/>
+            <a:ext cx="685800" cy="685800"/>
+          </a:xfrm>
+          <a:prstGeom prst="rect">
+            <a:avLst/>
+          </a:prstGeom>
+          <a:solidFill>
+            <a:schemeClr val="accent1"/>
+          </a:solidFill>
+          <a:ln>
+            <a:noFill/>
+          </a:ln>
+        </p:spPr>
+        <p:style>
+          <a:lnRef idx="2">
+            <a:schemeClr val="accent1">
+              <a:shade val="50000"/>
+            </a:schemeClr>
+          </a:lnRef>
+          <a:fillRef idx="1">
+            <a:schemeClr val="accent1"/>
+          </a:fillRef>
+          <a:effectRef idx="0">
+            <a:schemeClr val="accent1"/>
+          </a:effectRef>
+          <a:fontRef idx="minor">
+            <a:schemeClr val="lt1"/>
+          </a:fontRef>
+        </p:style>
+        <p:txBody>
+          <a:bodyPr rtlCol="0" anchor="ctr"/>
+          <a:lstStyle/>
+          <a:p>
+            <a:pPr algn="ctr"/>
+            <a:endParaRPr lang="en-US"/>
+          </a:p>
+        </p:txBody>
+      </p:sp>
+      <p:sp>
+        <p:nvSpPr>
+          <p:cNvPr id="6" name="Slide Number Placeholder 5"/>
+          <p:cNvSpPr>
+            <a:spLocks noGrp="1"/>
+          </p:cNvSpPr>
+          <p:nvPr>
+            <p:ph type="sldNum" sz="quarter" idx="4"/>
+          </p:nvPr>
+        </p:nvSpPr>
+        <p:spPr>
+          <a:xfrm>
+            <a:off x="8531788" y="5648960"/>
+            <a:ext cx="548640" cy="396240"/>
+          </a:xfrm>
+          <a:prstGeom prst="bracketPair">
+            <a:avLst>
+              <a:gd name="adj" fmla="val 17949"/>
+            </a:avLst>
+          </a:prstGeom>
+          <a:ln w="19050">
+            <a:solidFill>
+              <a:srgbClr val="FFFFFF"/>
+            </a:solidFill>
+          </a:ln>
+        </p:spPr>
+        <p:txBody>
+          <a:bodyPr vert="horz" lIns="0" tIns="0" rIns="0" bIns="0" rtlCol="0" anchor="ctr"/>
+          <a:lstStyle>
+            <a:lvl1pPr algn="ctr">
+              <a:defRPr sz="1800">
+                <a:solidFill>
+                  <a:srgbClr val="FFFFFF"/>
+                </a:solidFill>
+              </a:defRPr>
+            </a:lvl1pPr>
+          </a:lstStyle>
+          <a:p>
+            <a:fld id="{B19B0651-EE4F-4900-A07F-96A6BFA9D0F0}" type="slidenum">
+              <a:rPr lang="ru-RU" smtClean="0"/>
+              <a:t>‹#›</a:t>
+            </a:fld>
+            <a:endParaRPr lang="ru-RU"/>
+          </a:p>
+        </p:txBody>
+      </p:sp>
+      <p:sp>
+        <p:nvSpPr>
+          <p:cNvPr id="5" name="Footer Placeholder 4"/>
+          <p:cNvSpPr>
+            <a:spLocks noGrp="1"/>
+          </p:cNvSpPr>
+          <p:nvPr>
+            <p:ph type="ftr" sz="quarter" idx="3"/>
+          </p:nvPr>
+        </p:nvSpPr>
+        <p:spPr>
+          <a:xfrm rot="16200000">
+            <a:off x="7586910" y="4048760"/>
+            <a:ext cx="2367281" cy="365760"/>
           </a:xfrm>
           <a:prstGeom prst="rect">
             <a:avLst/>
@@ -2649,39 +2808,33 @@
         <p:txBody>
           <a:bodyPr vert="horz" lIns="91440" tIns="45720" rIns="91440" bIns="45720" rtlCol="0" anchor="ctr"/>
           <a:lstStyle>
-            <a:lvl1pPr algn="l">
+            <a:lvl1pPr algn="r">
               <a:defRPr sz="1200">
                 <a:solidFill>
-                  <a:schemeClr val="tx1">
-                    <a:tint val="75000"/>
-                  </a:schemeClr>
+                  <a:schemeClr val="bg2"/>
                 </a:solidFill>
               </a:defRPr>
             </a:lvl1pPr>
           </a:lstStyle>
           <a:p>
-            <a:fld id="{B4C71EC6-210F-42DE-9C53-41977AD35B3D}" type="datetimeFigureOut">
-              <a:rPr lang="ru-RU" smtClean="0"/>
-              <a:t>12.11.2009</a:t>
-            </a:fld>
             <a:endParaRPr lang="ru-RU"/>
           </a:p>
         </p:txBody>
       </p:sp>
       <p:sp>
         <p:nvSpPr>
-          <p:cNvPr id="5" name="Нижний колонтитул 4"/>
-          <p:cNvSpPr>
-            <a:spLocks noGrp="1"/>
-          </p:cNvSpPr>
-          <p:nvPr>
-            <p:ph type="ftr" sz="quarter" idx="3"/>
+          <p:cNvPr id="4" name="Date Placeholder 3"/>
+          <p:cNvSpPr>
+            <a:spLocks noGrp="1"/>
+          </p:cNvSpPr>
+          <p:nvPr>
+            <p:ph type="dt" sz="half" idx="2"/>
           </p:nvPr>
         </p:nvSpPr>
         <p:spPr>
-          <a:xfrm>
-            <a:off x="3124200" y="6356350"/>
-            <a:ext cx="2895600" cy="365125"/>
+          <a:xfrm rot="16200000">
+            <a:off x="7551351" y="1645920"/>
+            <a:ext cx="2438399" cy="365760"/>
           </a:xfrm>
           <a:prstGeom prst="rect">
             <a:avLst/>
@@ -2690,57 +2843,18 @@
         <p:txBody>
           <a:bodyPr vert="horz" lIns="91440" tIns="45720" rIns="91440" bIns="45720" rtlCol="0" anchor="ctr"/>
           <a:lstStyle>
-            <a:lvl1pPr algn="ctr">
+            <a:lvl1pPr algn="l">
               <a:defRPr sz="1200">
                 <a:solidFill>
-                  <a:schemeClr val="tx1">
-                    <a:tint val="75000"/>
-                  </a:schemeClr>
+                  <a:schemeClr val="bg2"/>
                 </a:solidFill>
               </a:defRPr>
             </a:lvl1pPr>
           </a:lstStyle>
           <a:p>
-            <a:endParaRPr lang="ru-RU"/>
-          </a:p>
-        </p:txBody>
-      </p:sp>
-      <p:sp>
-        <p:nvSpPr>
-          <p:cNvPr id="6" name="Номер слайда 5"/>
-          <p:cNvSpPr>
-            <a:spLocks noGrp="1"/>
-          </p:cNvSpPr>
-          <p:nvPr>
-            <p:ph type="sldNum" sz="quarter" idx="4"/>
-          </p:nvPr>
-        </p:nvSpPr>
-        <p:spPr>
-          <a:xfrm>
-            <a:off x="6553200" y="6356350"/>
-            <a:ext cx="2133600" cy="365125"/>
-          </a:xfrm>
-          <a:prstGeom prst="rect">
-            <a:avLst/>
-          </a:prstGeom>
-        </p:spPr>
-        <p:txBody>
-          <a:bodyPr vert="horz" lIns="91440" tIns="45720" rIns="91440" bIns="45720" rtlCol="0" anchor="ctr"/>
-          <a:lstStyle>
-            <a:lvl1pPr algn="r">
-              <a:defRPr sz="1200">
-                <a:solidFill>
-                  <a:schemeClr val="tx1">
-                    <a:tint val="75000"/>
-                  </a:schemeClr>
-                </a:solidFill>
-              </a:defRPr>
-            </a:lvl1pPr>
-          </a:lstStyle>
-          <a:p>
-            <a:fld id="{B19B0651-EE4F-4900-A07F-96A6BFA9D0F0}" type="slidenum">
-              <a:rPr lang="ru-RU" smtClean="0"/>
-              <a:t>‹#›</a:t>
+            <a:fld id="{B4C71EC6-210F-42DE-9C53-41977AD35B3D}" type="datetimeFigureOut">
+              <a:rPr lang="ru-RU" smtClean="0"/>
+              <a:t>26.02.2020</a:t>
             </a:fld>
             <a:endParaRPr lang="ru-RU"/>
           </a:p>
@@ -2750,29 +2864,33 @@
   </p:cSld>
   <p:clrMap bg1="lt1" tx1="dk1" bg2="lt2" tx2="dk2" accent1="accent1" accent2="accent2" accent3="accent3" accent4="accent4" accent5="accent5" accent6="accent6" hlink="hlink" folHlink="folHlink"/>
   <p:sldLayoutIdLst>
-    <p:sldLayoutId id="2147483649" r:id="rId1"/>
-    <p:sldLayoutId id="2147483650" r:id="rId2"/>
-    <p:sldLayoutId id="2147483651" r:id="rId3"/>
-    <p:sldLayoutId id="2147483652" r:id="rId4"/>
-    <p:sldLayoutId id="2147483653" r:id="rId5"/>
-    <p:sldLayoutId id="2147483654" r:id="rId6"/>
-    <p:sldLayoutId id="2147483655" r:id="rId7"/>
-    <p:sldLayoutId id="2147483656" r:id="rId8"/>
-    <p:sldLayoutId id="2147483657" r:id="rId9"/>
-    <p:sldLayoutId id="2147483658" r:id="rId10"/>
-    <p:sldLayoutId id="2147483659" r:id="rId11"/>
+    <p:sldLayoutId id="2147483673" r:id="rId1"/>
+    <p:sldLayoutId id="2147483674" r:id="rId2"/>
+    <p:sldLayoutId id="2147483675" r:id="rId3"/>
+    <p:sldLayoutId id="2147483676" r:id="rId4"/>
+    <p:sldLayoutId id="2147483677" r:id="rId5"/>
+    <p:sldLayoutId id="2147483678" r:id="rId6"/>
+    <p:sldLayoutId id="2147483679" r:id="rId7"/>
+    <p:sldLayoutId id="2147483680" r:id="rId8"/>
+    <p:sldLayoutId id="2147483681" r:id="rId9"/>
+    <p:sldLayoutId id="2147483682" r:id="rId10"/>
+    <p:sldLayoutId id="2147483683" r:id="rId11"/>
   </p:sldLayoutIdLst>
   <p:txStyles>
     <p:titleStyle>
-      <a:lvl1pPr algn="ctr" defTabSz="914400" rtl="0" eaLnBrk="1" latinLnBrk="0" hangingPunct="1">
+      <a:lvl1pPr algn="l" defTabSz="914400" rtl="0" eaLnBrk="1" latinLnBrk="0" hangingPunct="1">
         <a:spcBef>
           <a:spcPct val="0"/>
         </a:spcBef>
         <a:buNone/>
-        <a:defRPr sz="4400" kern="1200">
+        <a:defRPr sz="4600" kern="1200" cap="none" spc="-100" baseline="0">
+          <a:ln>
+            <a:noFill/>
+          </a:ln>
           <a:solidFill>
-            <a:schemeClr val="tx1"/>
+            <a:schemeClr val="tx2"/>
           </a:solidFill>
+          <a:effectLst/>
           <a:latin typeface="+mj-lt"/>
           <a:ea typeface="+mj-ea"/>
           <a:cs typeface="+mj-cs"/>
@@ -2780,13 +2898,16 @@
       </a:lvl1pPr>
     </p:titleStyle>
     <p:bodyStyle>
-      <a:lvl1pPr marL="342900" indent="-342900" algn="l" defTabSz="914400" rtl="0" eaLnBrk="1" latinLnBrk="0" hangingPunct="1">
+      <a:lvl1pPr marL="342900" indent="-228600" algn="l" defTabSz="914400" rtl="0" eaLnBrk="1" latinLnBrk="0" hangingPunct="1">
         <a:spcBef>
           <a:spcPct val="20000"/>
         </a:spcBef>
+        <a:buClr>
+          <a:schemeClr val="accent1"/>
+        </a:buClr>
         <a:buFont typeface="Arial" pitchFamily="34" charset="0"/>
         <a:buChar char="•"/>
-        <a:defRPr sz="3200" kern="1200">
+        <a:defRPr sz="2200" kern="1200">
           <a:solidFill>
             <a:schemeClr val="tx1"/>
           </a:solidFill>
@@ -2795,70 +2916,13 @@
           <a:cs typeface="+mn-cs"/>
         </a:defRPr>
       </a:lvl1pPr>
-      <a:lvl2pPr marL="742950" indent="-285750" algn="l" defTabSz="914400" rtl="0" eaLnBrk="1" latinLnBrk="0" hangingPunct="1">
+      <a:lvl2pPr marL="640080" indent="-228600" algn="l" defTabSz="914400" rtl="0" eaLnBrk="1" latinLnBrk="0" hangingPunct="1">
         <a:spcBef>
           <a:spcPct val="20000"/>
         </a:spcBef>
-        <a:buFont typeface="Arial" pitchFamily="34" charset="0"/>
-        <a:buChar char="–"/>
-        <a:defRPr sz="2800" kern="1200">
-          <a:solidFill>
-            <a:schemeClr val="tx1"/>
-          </a:solidFill>
-          <a:latin typeface="+mn-lt"/>
-          <a:ea typeface="+mn-ea"/>
-          <a:cs typeface="+mn-cs"/>
-        </a:defRPr>
-      </a:lvl2pPr>
-      <a:lvl3pPr marL="1143000" indent="-228600" algn="l" defTabSz="914400" rtl="0" eaLnBrk="1" latinLnBrk="0" hangingPunct="1">
-        <a:spcBef>
-          <a:spcPct val="20000"/>
-        </a:spcBef>
-        <a:buFont typeface="Arial" pitchFamily="34" charset="0"/>
-        <a:buChar char="•"/>
-        <a:defRPr sz="2400" kern="1200">
-          <a:solidFill>
-            <a:schemeClr val="tx1"/>
-          </a:solidFill>
-          <a:latin typeface="+mn-lt"/>
-          <a:ea typeface="+mn-ea"/>
-          <a:cs typeface="+mn-cs"/>
-        </a:defRPr>
-      </a:lvl3pPr>
-      <a:lvl4pPr marL="1600200" indent="-228600" algn="l" defTabSz="914400" rtl="0" eaLnBrk="1" latinLnBrk="0" hangingPunct="1">
-        <a:spcBef>
-          <a:spcPct val="20000"/>
-        </a:spcBef>
-        <a:buFont typeface="Arial" pitchFamily="34" charset="0"/>
-        <a:buChar char="–"/>
-        <a:defRPr sz="2000" kern="1200">
-          <a:solidFill>
-            <a:schemeClr val="tx1"/>
-          </a:solidFill>
-          <a:latin typeface="+mn-lt"/>
-          <a:ea typeface="+mn-ea"/>
-          <a:cs typeface="+mn-cs"/>
-        </a:defRPr>
-      </a:lvl4pPr>
-      <a:lvl5pPr marL="2057400" indent="-228600" algn="l" defTabSz="914400" rtl="0" eaLnBrk="1" latinLnBrk="0" hangingPunct="1">
-        <a:spcBef>
-          <a:spcPct val="20000"/>
-        </a:spcBef>
-        <a:buFont typeface="Arial" pitchFamily="34" charset="0"/>
-        <a:buChar char="»"/>
-        <a:defRPr sz="2000" kern="1200">
-          <a:solidFill>
-            <a:schemeClr val="tx1"/>
-          </a:solidFill>
-          <a:latin typeface="+mn-lt"/>
-          <a:ea typeface="+mn-ea"/>
-          <a:cs typeface="+mn-cs"/>
-        </a:defRPr>
-      </a:lvl5pPr>
-      <a:lvl6pPr marL="2514600" indent="-228600" algn="l" defTabSz="914400" rtl="0" eaLnBrk="1" latinLnBrk="0" hangingPunct="1">
-        <a:spcBef>
-          <a:spcPct val="20000"/>
-        </a:spcBef>
+        <a:buClr>
+          <a:schemeClr val="accent2"/>
+        </a:buClr>
         <a:buFont typeface="Arial" pitchFamily="34" charset="0"/>
         <a:buChar char="•"/>
         <a:defRPr sz="2000" kern="1200">
@@ -2869,14 +2933,89 @@
           <a:ea typeface="+mn-ea"/>
           <a:cs typeface="+mn-cs"/>
         </a:defRPr>
-      </a:lvl6pPr>
-      <a:lvl7pPr marL="2971800" indent="-228600" algn="l" defTabSz="914400" rtl="0" eaLnBrk="1" latinLnBrk="0" hangingPunct="1">
+      </a:lvl2pPr>
+      <a:lvl3pPr marL="1005840" indent="-228600" algn="l" defTabSz="914400" rtl="0" eaLnBrk="1" latinLnBrk="0" hangingPunct="1">
         <a:spcBef>
           <a:spcPct val="20000"/>
         </a:spcBef>
+        <a:buClr>
+          <a:schemeClr val="accent3"/>
+        </a:buClr>
         <a:buFont typeface="Arial" pitchFamily="34" charset="0"/>
         <a:buChar char="•"/>
-        <a:defRPr sz="2000" kern="1200">
+        <a:defRPr sz="1800" kern="1200">
+          <a:solidFill>
+            <a:schemeClr val="tx1"/>
+          </a:solidFill>
+          <a:latin typeface="+mn-lt"/>
+          <a:ea typeface="+mn-ea"/>
+          <a:cs typeface="+mn-cs"/>
+        </a:defRPr>
+      </a:lvl3pPr>
+      <a:lvl4pPr marL="1280160" indent="-228600" algn="l" defTabSz="914400" rtl="0" eaLnBrk="1" latinLnBrk="0" hangingPunct="1">
+        <a:spcBef>
+          <a:spcPct val="20000"/>
+        </a:spcBef>
+        <a:buClr>
+          <a:schemeClr val="accent4"/>
+        </a:buClr>
+        <a:buFont typeface="Arial" pitchFamily="34" charset="0"/>
+        <a:buChar char="•"/>
+        <a:defRPr sz="1600" kern="1200">
+          <a:solidFill>
+            <a:schemeClr val="tx1"/>
+          </a:solidFill>
+          <a:latin typeface="+mn-lt"/>
+          <a:ea typeface="+mn-ea"/>
+          <a:cs typeface="+mn-cs"/>
+        </a:defRPr>
+      </a:lvl4pPr>
+      <a:lvl5pPr marL="1554480" indent="-228600" algn="l" defTabSz="914400" rtl="0" eaLnBrk="1" latinLnBrk="0" hangingPunct="1">
+        <a:spcBef>
+          <a:spcPct val="20000"/>
+        </a:spcBef>
+        <a:buClr>
+          <a:schemeClr val="accent5"/>
+        </a:buClr>
+        <a:buFont typeface="Arial" pitchFamily="34" charset="0"/>
+        <a:buChar char="•"/>
+        <a:defRPr sz="1400" kern="1200" baseline="0">
+          <a:solidFill>
+            <a:schemeClr val="tx1"/>
+          </a:solidFill>
+          <a:latin typeface="+mn-lt"/>
+          <a:ea typeface="+mn-ea"/>
+          <a:cs typeface="+mn-cs"/>
+        </a:defRPr>
+      </a:lvl5pPr>
+      <a:lvl6pPr marL="1737360" indent="-182880" algn="l" defTabSz="914400" rtl="0" eaLnBrk="1" latinLnBrk="0" hangingPunct="1">
+        <a:spcBef>
+          <a:spcPct val="20000"/>
+        </a:spcBef>
+        <a:buClr>
+          <a:schemeClr val="accent1"/>
+        </a:buClr>
+        <a:buFont typeface="Arial" pitchFamily="34" charset="0"/>
+        <a:buChar char="•"/>
+        <a:defRPr sz="1400" kern="1200" baseline="0">
+          <a:solidFill>
+            <a:schemeClr val="tx1"/>
+          </a:solidFill>
+          <a:latin typeface="+mn-lt"/>
+          <a:ea typeface="+mn-ea"/>
+          <a:cs typeface="+mn-cs"/>
+        </a:defRPr>
+      </a:lvl6pPr>
+      <a:lvl7pPr marL="1920240" indent="-182880" algn="l" defTabSz="914400" rtl="0" eaLnBrk="1" latinLnBrk="0" hangingPunct="1">
+        <a:spcBef>
+          <a:spcPct val="20000"/>
+        </a:spcBef>
+        <a:buClr>
+          <a:schemeClr val="accent2"/>
+        </a:buClr>
+        <a:buFont typeface="Arial" pitchFamily="34" charset="0"/>
+        <a:buChar char="•"/>
+        <a:defRPr sz="1400" kern="1200">
           <a:solidFill>
             <a:schemeClr val="tx1"/>
           </a:solidFill>
@@ -2885,13 +3024,16 @@
           <a:cs typeface="+mn-cs"/>
         </a:defRPr>
       </a:lvl7pPr>
-      <a:lvl8pPr marL="3429000" indent="-228600" algn="l" defTabSz="914400" rtl="0" eaLnBrk="1" latinLnBrk="0" hangingPunct="1">
+      <a:lvl8pPr marL="2103120" indent="-182880" algn="l" defTabSz="914400" rtl="0" eaLnBrk="1" latinLnBrk="0" hangingPunct="1">
         <a:spcBef>
           <a:spcPct val="20000"/>
         </a:spcBef>
+        <a:buClr>
+          <a:schemeClr val="accent3"/>
+        </a:buClr>
         <a:buFont typeface="Arial" pitchFamily="34" charset="0"/>
         <a:buChar char="•"/>
-        <a:defRPr sz="2000" kern="1200">
+        <a:defRPr sz="1400" kern="1200">
           <a:solidFill>
             <a:schemeClr val="tx1"/>
           </a:solidFill>
@@ -2900,13 +3042,16 @@
           <a:cs typeface="+mn-cs"/>
         </a:defRPr>
       </a:lvl8pPr>
-      <a:lvl9pPr marL="3886200" indent="-228600" algn="l" defTabSz="914400" rtl="0" eaLnBrk="1" latinLnBrk="0" hangingPunct="1">
+      <a:lvl9pPr marL="2286000" indent="-182880" algn="l" defTabSz="914400" rtl="0" eaLnBrk="1" latinLnBrk="0" hangingPunct="1">
         <a:spcBef>
           <a:spcPct val="20000"/>
         </a:spcBef>
+        <a:buClr>
+          <a:schemeClr val="accent4"/>
+        </a:buClr>
         <a:buFont typeface="Arial" pitchFamily="34" charset="0"/>
         <a:buChar char="•"/>
-        <a:defRPr sz="2000" kern="1200">
+        <a:defRPr sz="1400" kern="1200">
           <a:solidFill>
             <a:schemeClr val="tx1"/>
           </a:solidFill>
@@ -2918,7 +3063,7 @@
     </p:bodyStyle>
     <p:otherStyle>
       <a:defPPr>
-        <a:defRPr lang="ru-RU"/>
+        <a:defRPr lang="en-US"/>
       </a:defPPr>
       <a:lvl1pPr marL="0" algn="l" defTabSz="914400" rtl="0" eaLnBrk="1" latinLnBrk="0" hangingPunct="1">
         <a:defRPr sz="1800" kern="1200">
@@ -3015,10 +3160,914 @@
 </p:sldMaster>
 </file>
 
+<file path=ppt/slides/slide1.xml><?xml version="1.0" encoding="utf-8"?>
+<p:sld xmlns:a="http://schemas.openxmlformats.org/drawingml/2006/main" xmlns:r="http://schemas.openxmlformats.org/officeDocument/2006/relationships" xmlns:p="http://schemas.openxmlformats.org/presentationml/2006/main">
+  <p:cSld>
+    <p:spTree>
+      <p:nvGrpSpPr>
+        <p:cNvPr id="1" name=""/>
+        <p:cNvGrpSpPr/>
+        <p:nvPr/>
+      </p:nvGrpSpPr>
+      <p:grpSpPr>
+        <a:xfrm>
+          <a:off x="0" y="0"/>
+          <a:ext cx="0" cy="0"/>
+          <a:chOff x="0" y="0"/>
+          <a:chExt cx="0" cy="0"/>
+        </a:xfrm>
+      </p:grpSpPr>
+      <p:sp>
+        <p:nvSpPr>
+          <p:cNvPr id="2" name="Заголовок 1"/>
+          <p:cNvSpPr>
+            <a:spLocks noGrp="1"/>
+          </p:cNvSpPr>
+          <p:nvPr>
+            <p:ph type="ctrTitle"/>
+          </p:nvPr>
+        </p:nvSpPr>
+        <p:spPr>
+          <a:xfrm>
+            <a:off x="0" y="3284984"/>
+            <a:ext cx="8443392" cy="1152128"/>
+          </a:xfrm>
+        </p:spPr>
+        <p:txBody>
+          <a:bodyPr/>
+          <a:lstStyle/>
+          <a:p>
+            <a:r>
+              <a:rPr lang="ru-RU" dirty="0" smtClean="0"/>
+              <a:t>Разработка игры на </a:t>
+            </a:r>
+            <a:r>
+              <a:rPr lang="en-US" dirty="0" smtClean="0"/>
+              <a:t>Python</a:t>
+            </a:r>
+            <a:endParaRPr lang="ru-RU" dirty="0"/>
+          </a:p>
+        </p:txBody>
+      </p:sp>
+    </p:spTree>
+    <p:extLst>
+      <p:ext uri="{BB962C8B-B14F-4D97-AF65-F5344CB8AC3E}">
+        <p14:creationId xmlns:p14="http://schemas.microsoft.com/office/powerpoint/2010/main" val="2001631149"/>
+      </p:ext>
+    </p:extLst>
+  </p:cSld>
+  <p:clrMapOvr>
+    <a:masterClrMapping/>
+  </p:clrMapOvr>
+  <p:timing>
+    <p:tnLst>
+      <p:par>
+        <p:cTn id="1" dur="indefinite" restart="never" nodeType="tmRoot"/>
+      </p:par>
+    </p:tnLst>
+  </p:timing>
+</p:sld>
+</file>
+
+<file path=ppt/slides/slide2.xml><?xml version="1.0" encoding="utf-8"?>
+<p:sld xmlns:a="http://schemas.openxmlformats.org/drawingml/2006/main" xmlns:r="http://schemas.openxmlformats.org/officeDocument/2006/relationships" xmlns:p="http://schemas.openxmlformats.org/presentationml/2006/main">
+  <p:cSld>
+    <p:spTree>
+      <p:nvGrpSpPr>
+        <p:cNvPr id="1" name=""/>
+        <p:cNvGrpSpPr/>
+        <p:nvPr/>
+      </p:nvGrpSpPr>
+      <p:grpSpPr>
+        <a:xfrm>
+          <a:off x="0" y="0"/>
+          <a:ext cx="0" cy="0"/>
+          <a:chOff x="0" y="0"/>
+          <a:chExt cx="0" cy="0"/>
+        </a:xfrm>
+      </p:grpSpPr>
+      <p:sp>
+        <p:nvSpPr>
+          <p:cNvPr id="2" name="Заголовок 1"/>
+          <p:cNvSpPr>
+            <a:spLocks noGrp="1"/>
+          </p:cNvSpPr>
+          <p:nvPr>
+            <p:ph type="title"/>
+          </p:nvPr>
+        </p:nvSpPr>
+        <p:spPr>
+          <a:xfrm>
+            <a:off x="2082552" y="332656"/>
+            <a:ext cx="4978896" cy="1143000"/>
+          </a:xfrm>
+        </p:spPr>
+        <p:txBody>
+          <a:bodyPr/>
+          <a:lstStyle/>
+          <a:p>
+            <a:r>
+              <a:rPr lang="ru-RU" dirty="0" smtClean="0"/>
+              <a:t>Что такое </a:t>
+            </a:r>
+            <a:r>
+              <a:rPr lang="en-US" dirty="0" smtClean="0"/>
+              <a:t>Python?</a:t>
+            </a:r>
+            <a:endParaRPr lang="ru-RU" dirty="0"/>
+          </a:p>
+        </p:txBody>
+      </p:sp>
+      <p:sp>
+        <p:nvSpPr>
+          <p:cNvPr id="3" name="Объект 2"/>
+          <p:cNvSpPr>
+            <a:spLocks noGrp="1"/>
+          </p:cNvSpPr>
+          <p:nvPr>
+            <p:ph idx="1"/>
+          </p:nvPr>
+        </p:nvSpPr>
+        <p:spPr>
+          <a:xfrm>
+            <a:off x="107504" y="1340768"/>
+            <a:ext cx="3744416" cy="5400600"/>
+          </a:xfrm>
+        </p:spPr>
+        <p:txBody>
+          <a:bodyPr>
+            <a:normAutofit/>
+          </a:bodyPr>
+          <a:lstStyle/>
+          <a:p>
+            <a:pPr marL="114300" indent="0">
+              <a:buNone/>
+            </a:pPr>
+            <a:r>
+              <a:rPr lang="ru-RU" dirty="0" err="1"/>
+              <a:t>Python</a:t>
+            </a:r>
+            <a:r>
+              <a:rPr lang="ru-RU" dirty="0"/>
+              <a:t> — активно развивающийся язык программирования, общего назначения, ориентированный на повышение производительности разработчика и читаемости кода.</a:t>
+            </a:r>
+            <a:endParaRPr lang="ru-RU" dirty="0"/>
+          </a:p>
+        </p:txBody>
+      </p:sp>
+      <p:pic>
+        <p:nvPicPr>
+          <p:cNvPr id="2050" name="Picture 2" descr="C:\Users\DOMAV\OneDrive\Desktop\Снимок.JPG"/>
+          <p:cNvPicPr>
+            <a:picLocks noChangeAspect="1" noChangeArrowheads="1"/>
+          </p:cNvPicPr>
+          <p:nvPr/>
+        </p:nvPicPr>
+        <p:blipFill>
+          <a:blip r:embed="rId2">
+            <a:extLst>
+              <a:ext uri="{28A0092B-C50C-407E-A947-70E740481C1C}">
+                <a14:useLocalDpi xmlns:a14="http://schemas.microsoft.com/office/drawing/2010/main" val="0"/>
+              </a:ext>
+            </a:extLst>
+          </a:blip>
+          <a:srcRect/>
+          <a:stretch>
+            <a:fillRect/>
+          </a:stretch>
+        </p:blipFill>
+        <p:spPr bwMode="auto">
+          <a:xfrm>
+            <a:off x="3779912" y="1841373"/>
+            <a:ext cx="4514842" cy="3349539"/>
+          </a:xfrm>
+          <a:prstGeom prst="rect">
+            <a:avLst/>
+          </a:prstGeom>
+          <a:noFill/>
+          <a:extLst>
+            <a:ext uri="{909E8E84-426E-40DD-AFC4-6F175D3DCCD1}">
+              <a14:hiddenFill xmlns:a14="http://schemas.microsoft.com/office/drawing/2010/main">
+                <a:solidFill>
+                  <a:srgbClr val="FFFFFF"/>
+                </a:solidFill>
+              </a14:hiddenFill>
+            </a:ext>
+          </a:extLst>
+        </p:spPr>
+      </p:pic>
+    </p:spTree>
+    <p:extLst>
+      <p:ext uri="{BB962C8B-B14F-4D97-AF65-F5344CB8AC3E}">
+        <p14:creationId xmlns:p14="http://schemas.microsoft.com/office/powerpoint/2010/main" val="508293380"/>
+      </p:ext>
+    </p:extLst>
+  </p:cSld>
+  <p:clrMapOvr>
+    <a:masterClrMapping/>
+  </p:clrMapOvr>
+  <p:timing>
+    <p:tnLst>
+      <p:par>
+        <p:cTn id="1" dur="indefinite" restart="never" nodeType="tmRoot"/>
+      </p:par>
+    </p:tnLst>
+  </p:timing>
+</p:sld>
+</file>
+
+<file path=ppt/slides/slide3.xml><?xml version="1.0" encoding="utf-8"?>
+<p:sld xmlns:a="http://schemas.openxmlformats.org/drawingml/2006/main" xmlns:r="http://schemas.openxmlformats.org/officeDocument/2006/relationships" xmlns:p="http://schemas.openxmlformats.org/presentationml/2006/main">
+  <p:cSld>
+    <p:spTree>
+      <p:nvGrpSpPr>
+        <p:cNvPr id="1" name=""/>
+        <p:cNvGrpSpPr/>
+        <p:nvPr/>
+      </p:nvGrpSpPr>
+      <p:grpSpPr>
+        <a:xfrm>
+          <a:off x="0" y="0"/>
+          <a:ext cx="0" cy="0"/>
+          <a:chOff x="0" y="0"/>
+          <a:chExt cx="0" cy="0"/>
+        </a:xfrm>
+      </p:grpSpPr>
+      <p:pic>
+        <p:nvPicPr>
+          <p:cNvPr id="3074" name="Picture 2" descr="C:\Users\DOMAV\OneDrive\Desktop\Снимок.JPG"/>
+          <p:cNvPicPr>
+            <a:picLocks noChangeAspect="1" noChangeArrowheads="1"/>
+          </p:cNvPicPr>
+          <p:nvPr/>
+        </p:nvPicPr>
+        <p:blipFill>
+          <a:blip r:embed="rId2">
+            <a:extLst>
+              <a:ext uri="{28A0092B-C50C-407E-A947-70E740481C1C}">
+                <a14:useLocalDpi xmlns:a14="http://schemas.microsoft.com/office/drawing/2010/main" val="0"/>
+              </a:ext>
+            </a:extLst>
+          </a:blip>
+          <a:srcRect/>
+          <a:stretch>
+            <a:fillRect/>
+          </a:stretch>
+        </p:blipFill>
+        <p:spPr bwMode="auto">
+          <a:xfrm>
+            <a:off x="107504" y="1268760"/>
+            <a:ext cx="8208912" cy="3744416"/>
+          </a:xfrm>
+          <a:prstGeom prst="rect">
+            <a:avLst/>
+          </a:prstGeom>
+          <a:noFill/>
+          <a:extLst>
+            <a:ext uri="{909E8E84-426E-40DD-AFC4-6F175D3DCCD1}">
+              <a14:hiddenFill xmlns:a14="http://schemas.microsoft.com/office/drawing/2010/main">
+                <a:solidFill>
+                  <a:srgbClr val="FFFFFF"/>
+                </a:solidFill>
+              </a14:hiddenFill>
+            </a:ext>
+          </a:extLst>
+        </p:spPr>
+      </p:pic>
+    </p:spTree>
+    <p:extLst>
+      <p:ext uri="{BB962C8B-B14F-4D97-AF65-F5344CB8AC3E}">
+        <p14:creationId xmlns:p14="http://schemas.microsoft.com/office/powerpoint/2010/main" val="3610976090"/>
+      </p:ext>
+    </p:extLst>
+  </p:cSld>
+  <p:clrMapOvr>
+    <a:masterClrMapping/>
+  </p:clrMapOvr>
+  <p:timing>
+    <p:tnLst>
+      <p:par>
+        <p:cTn id="1" dur="indefinite" restart="never" nodeType="tmRoot"/>
+      </p:par>
+    </p:tnLst>
+  </p:timing>
+</p:sld>
+</file>
+
+<file path=ppt/slides/slide4.xml><?xml version="1.0" encoding="utf-8"?>
+<p:sld xmlns:a="http://schemas.openxmlformats.org/drawingml/2006/main" xmlns:r="http://schemas.openxmlformats.org/officeDocument/2006/relationships" xmlns:p="http://schemas.openxmlformats.org/presentationml/2006/main">
+  <p:cSld>
+    <p:spTree>
+      <p:nvGrpSpPr>
+        <p:cNvPr id="1" name=""/>
+        <p:cNvGrpSpPr/>
+        <p:nvPr/>
+      </p:nvGrpSpPr>
+      <p:grpSpPr>
+        <a:xfrm>
+          <a:off x="0" y="0"/>
+          <a:ext cx="0" cy="0"/>
+          <a:chOff x="0" y="0"/>
+          <a:chExt cx="0" cy="0"/>
+        </a:xfrm>
+      </p:grpSpPr>
+      <p:sp>
+        <p:nvSpPr>
+          <p:cNvPr id="2" name="Заголовок 1"/>
+          <p:cNvSpPr>
+            <a:spLocks noGrp="1"/>
+          </p:cNvSpPr>
+          <p:nvPr>
+            <p:ph type="title"/>
+          </p:nvPr>
+        </p:nvSpPr>
+        <p:spPr>
+          <a:xfrm>
+            <a:off x="2699792" y="260648"/>
+            <a:ext cx="3744416" cy="1143000"/>
+          </a:xfrm>
+        </p:spPr>
+        <p:txBody>
+          <a:bodyPr/>
+          <a:lstStyle/>
+          <a:p>
+            <a:r>
+              <a:rPr lang="ru-RU" dirty="0" smtClean="0"/>
+              <a:t>Идея проекта</a:t>
+            </a:r>
+            <a:endParaRPr lang="ru-RU" dirty="0"/>
+          </a:p>
+        </p:txBody>
+      </p:sp>
+      <p:sp>
+        <p:nvSpPr>
+          <p:cNvPr id="3" name="Объект 2"/>
+          <p:cNvSpPr>
+            <a:spLocks noGrp="1"/>
+          </p:cNvSpPr>
+          <p:nvPr>
+            <p:ph idx="1"/>
+          </p:nvPr>
+        </p:nvSpPr>
+        <p:spPr>
+          <a:xfrm>
+            <a:off x="107504" y="1412776"/>
+            <a:ext cx="4464496" cy="5400600"/>
+          </a:xfrm>
+        </p:spPr>
+        <p:txBody>
+          <a:bodyPr/>
+          <a:lstStyle/>
+          <a:p>
+            <a:pPr marL="114300" indent="0">
+              <a:buNone/>
+            </a:pPr>
+            <a:r>
+              <a:rPr lang="ru-RU" dirty="0" smtClean="0"/>
+              <a:t>Написать </a:t>
+            </a:r>
+            <a:r>
+              <a:rPr lang="ru-RU" dirty="0"/>
+              <a:t>игру “Сапер” на языке программирования </a:t>
+            </a:r>
+            <a:r>
+              <a:rPr lang="en-US" dirty="0"/>
+              <a:t>Python</a:t>
+            </a:r>
+            <a:r>
+              <a:rPr lang="ru-RU" dirty="0"/>
+              <a:t> с использованием библиотеки </a:t>
+            </a:r>
+            <a:r>
+              <a:rPr lang="en-US" dirty="0" err="1"/>
+              <a:t>Tkinter</a:t>
+            </a:r>
+            <a:r>
+              <a:rPr lang="ru-RU" dirty="0"/>
+              <a:t>.</a:t>
+            </a:r>
+            <a:endParaRPr lang="ru-RU" dirty="0"/>
+          </a:p>
+        </p:txBody>
+      </p:sp>
+      <p:pic>
+        <p:nvPicPr>
+          <p:cNvPr id="1026" name="Picture 2" descr="C:\Users\DOMAV\OneDrive\Desktop\Снимок.JPG"/>
+          <p:cNvPicPr>
+            <a:picLocks noChangeAspect="1" noChangeArrowheads="1"/>
+          </p:cNvPicPr>
+          <p:nvPr/>
+        </p:nvPicPr>
+        <p:blipFill>
+          <a:blip r:embed="rId2">
+            <a:extLst>
+              <a:ext uri="{28A0092B-C50C-407E-A947-70E740481C1C}">
+                <a14:useLocalDpi xmlns:a14="http://schemas.microsoft.com/office/drawing/2010/main" val="0"/>
+              </a:ext>
+            </a:extLst>
+          </a:blip>
+          <a:srcRect/>
+          <a:stretch>
+            <a:fillRect/>
+          </a:stretch>
+        </p:blipFill>
+        <p:spPr bwMode="auto">
+          <a:xfrm>
+            <a:off x="5220072" y="1844824"/>
+            <a:ext cx="2794447" cy="3645974"/>
+          </a:xfrm>
+          <a:prstGeom prst="rect">
+            <a:avLst/>
+          </a:prstGeom>
+          <a:noFill/>
+          <a:extLst>
+            <a:ext uri="{909E8E84-426E-40DD-AFC4-6F175D3DCCD1}">
+              <a14:hiddenFill xmlns:a14="http://schemas.microsoft.com/office/drawing/2010/main">
+                <a:solidFill>
+                  <a:srgbClr val="FFFFFF"/>
+                </a:solidFill>
+              </a14:hiddenFill>
+            </a:ext>
+          </a:extLst>
+        </p:spPr>
+      </p:pic>
+    </p:spTree>
+    <p:extLst>
+      <p:ext uri="{BB962C8B-B14F-4D97-AF65-F5344CB8AC3E}">
+        <p14:creationId xmlns:p14="http://schemas.microsoft.com/office/powerpoint/2010/main" val="962482999"/>
+      </p:ext>
+    </p:extLst>
+  </p:cSld>
+  <p:clrMapOvr>
+    <a:masterClrMapping/>
+  </p:clrMapOvr>
+  <p:timing>
+    <p:tnLst>
+      <p:par>
+        <p:cTn id="1" dur="indefinite" restart="never" nodeType="tmRoot"/>
+      </p:par>
+    </p:tnLst>
+  </p:timing>
+</p:sld>
+</file>
+
+<file path=ppt/slides/slide5.xml><?xml version="1.0" encoding="utf-8"?>
+<p:sld xmlns:a="http://schemas.openxmlformats.org/drawingml/2006/main" xmlns:r="http://schemas.openxmlformats.org/officeDocument/2006/relationships" xmlns:p="http://schemas.openxmlformats.org/presentationml/2006/main">
+  <p:cSld>
+    <p:spTree>
+      <p:nvGrpSpPr>
+        <p:cNvPr id="1" name=""/>
+        <p:cNvGrpSpPr/>
+        <p:nvPr/>
+      </p:nvGrpSpPr>
+      <p:grpSpPr>
+        <a:xfrm>
+          <a:off x="0" y="0"/>
+          <a:ext cx="0" cy="0"/>
+          <a:chOff x="0" y="0"/>
+          <a:chExt cx="0" cy="0"/>
+        </a:xfrm>
+      </p:grpSpPr>
+      <p:sp>
+        <p:nvSpPr>
+          <p:cNvPr id="2" name="Заголовок 1"/>
+          <p:cNvSpPr>
+            <a:spLocks noGrp="1"/>
+          </p:cNvSpPr>
+          <p:nvPr>
+            <p:ph type="title"/>
+          </p:nvPr>
+        </p:nvSpPr>
+        <p:spPr>
+          <a:xfrm>
+            <a:off x="3558716" y="260648"/>
+            <a:ext cx="2026568" cy="1143000"/>
+          </a:xfrm>
+        </p:spPr>
+        <p:txBody>
+          <a:bodyPr/>
+          <a:lstStyle/>
+          <a:p>
+            <a:r>
+              <a:rPr lang="ru-RU" dirty="0" smtClean="0"/>
+              <a:t>О игре</a:t>
+            </a:r>
+            <a:endParaRPr lang="ru-RU" dirty="0"/>
+          </a:p>
+        </p:txBody>
+      </p:sp>
+      <p:sp>
+        <p:nvSpPr>
+          <p:cNvPr id="3" name="Объект 2"/>
+          <p:cNvSpPr>
+            <a:spLocks noGrp="1"/>
+          </p:cNvSpPr>
+          <p:nvPr>
+            <p:ph idx="1"/>
+          </p:nvPr>
+        </p:nvSpPr>
+        <p:spPr>
+          <a:xfrm>
+            <a:off x="107504" y="1340768"/>
+            <a:ext cx="4464496" cy="3384376"/>
+          </a:xfrm>
+        </p:spPr>
+        <p:txBody>
+          <a:bodyPr/>
+          <a:lstStyle/>
+          <a:p>
+            <a:pPr marL="114300" indent="0">
+              <a:buNone/>
+            </a:pPr>
+            <a:r>
+              <a:rPr lang="ru-RU" dirty="0"/>
+              <a:t>«Сапёр» ( англ. </a:t>
+            </a:r>
+            <a:r>
+              <a:rPr lang="ru-RU" dirty="0" err="1"/>
+              <a:t>Minesweeper</a:t>
+            </a:r>
+            <a:r>
+              <a:rPr lang="ru-RU" dirty="0"/>
+              <a:t>) — компьютерная игра-головоломка.</a:t>
+            </a:r>
+          </a:p>
+          <a:p>
+            <a:pPr marL="114300" indent="0">
+              <a:buNone/>
+            </a:pPr>
+            <a:r>
+              <a:rPr lang="ru-RU" dirty="0"/>
+              <a:t>Цель игры состоит в том, чтобы очистить прямоугольную доску, содержащую скрытые "мины" или бомбы, не взорвав ни одной из них, с помощью подсказок о количестве соседних мин в каждом поле.</a:t>
+            </a:r>
+            <a:endParaRPr lang="ru-RU" dirty="0"/>
+          </a:p>
+        </p:txBody>
+      </p:sp>
+      <p:sp>
+        <p:nvSpPr>
+          <p:cNvPr id="4" name="Объект 2"/>
+          <p:cNvSpPr txBox="1">
+            <a:spLocks/>
+          </p:cNvSpPr>
+          <p:nvPr/>
+        </p:nvSpPr>
+        <p:spPr>
+          <a:xfrm>
+            <a:off x="4283968" y="3212976"/>
+            <a:ext cx="4104456" cy="3600400"/>
+          </a:xfrm>
+          <a:prstGeom prst="rect">
+            <a:avLst/>
+          </a:prstGeom>
+        </p:spPr>
+        <p:txBody>
+          <a:bodyPr vert="horz" lIns="91440" tIns="45720" rIns="91440" bIns="45720" rtlCol="0">
+            <a:normAutofit/>
+          </a:bodyPr>
+          <a:lstStyle>
+            <a:lvl1pPr marL="342900" indent="-228600" algn="l" defTabSz="914400" rtl="0" eaLnBrk="1" latinLnBrk="0" hangingPunct="1">
+              <a:spcBef>
+                <a:spcPct val="20000"/>
+              </a:spcBef>
+              <a:buClr>
+                <a:schemeClr val="accent1"/>
+              </a:buClr>
+              <a:buFont typeface="Arial" pitchFamily="34" charset="0"/>
+              <a:buChar char="•"/>
+              <a:defRPr sz="2200" kern="1200">
+                <a:solidFill>
+                  <a:schemeClr val="tx1"/>
+                </a:solidFill>
+                <a:latin typeface="+mn-lt"/>
+                <a:ea typeface="+mn-ea"/>
+                <a:cs typeface="+mn-cs"/>
+              </a:defRPr>
+            </a:lvl1pPr>
+            <a:lvl2pPr marL="640080" indent="-228600" algn="l" defTabSz="914400" rtl="0" eaLnBrk="1" latinLnBrk="0" hangingPunct="1">
+              <a:spcBef>
+                <a:spcPct val="20000"/>
+              </a:spcBef>
+              <a:buClr>
+                <a:schemeClr val="accent2"/>
+              </a:buClr>
+              <a:buFont typeface="Arial" pitchFamily="34" charset="0"/>
+              <a:buChar char="•"/>
+              <a:defRPr sz="2000" kern="1200">
+                <a:solidFill>
+                  <a:schemeClr val="tx1"/>
+                </a:solidFill>
+                <a:latin typeface="+mn-lt"/>
+                <a:ea typeface="+mn-ea"/>
+                <a:cs typeface="+mn-cs"/>
+              </a:defRPr>
+            </a:lvl2pPr>
+            <a:lvl3pPr marL="1005840" indent="-228600" algn="l" defTabSz="914400" rtl="0" eaLnBrk="1" latinLnBrk="0" hangingPunct="1">
+              <a:spcBef>
+                <a:spcPct val="20000"/>
+              </a:spcBef>
+              <a:buClr>
+                <a:schemeClr val="accent3"/>
+              </a:buClr>
+              <a:buFont typeface="Arial" pitchFamily="34" charset="0"/>
+              <a:buChar char="•"/>
+              <a:defRPr sz="1800" kern="1200">
+                <a:solidFill>
+                  <a:schemeClr val="tx1"/>
+                </a:solidFill>
+                <a:latin typeface="+mn-lt"/>
+                <a:ea typeface="+mn-ea"/>
+                <a:cs typeface="+mn-cs"/>
+              </a:defRPr>
+            </a:lvl3pPr>
+            <a:lvl4pPr marL="1280160" indent="-228600" algn="l" defTabSz="914400" rtl="0" eaLnBrk="1" latinLnBrk="0" hangingPunct="1">
+              <a:spcBef>
+                <a:spcPct val="20000"/>
+              </a:spcBef>
+              <a:buClr>
+                <a:schemeClr val="accent4"/>
+              </a:buClr>
+              <a:buFont typeface="Arial" pitchFamily="34" charset="0"/>
+              <a:buChar char="•"/>
+              <a:defRPr sz="1600" kern="1200">
+                <a:solidFill>
+                  <a:schemeClr val="tx1"/>
+                </a:solidFill>
+                <a:latin typeface="+mn-lt"/>
+                <a:ea typeface="+mn-ea"/>
+                <a:cs typeface="+mn-cs"/>
+              </a:defRPr>
+            </a:lvl4pPr>
+            <a:lvl5pPr marL="1554480" indent="-228600" algn="l" defTabSz="914400" rtl="0" eaLnBrk="1" latinLnBrk="0" hangingPunct="1">
+              <a:spcBef>
+                <a:spcPct val="20000"/>
+              </a:spcBef>
+              <a:buClr>
+                <a:schemeClr val="accent5"/>
+              </a:buClr>
+              <a:buFont typeface="Arial" pitchFamily="34" charset="0"/>
+              <a:buChar char="•"/>
+              <a:defRPr sz="1400" kern="1200" baseline="0">
+                <a:solidFill>
+                  <a:schemeClr val="tx1"/>
+                </a:solidFill>
+                <a:latin typeface="+mn-lt"/>
+                <a:ea typeface="+mn-ea"/>
+                <a:cs typeface="+mn-cs"/>
+              </a:defRPr>
+            </a:lvl5pPr>
+            <a:lvl6pPr marL="1737360" indent="-182880" algn="l" defTabSz="914400" rtl="0" eaLnBrk="1" latinLnBrk="0" hangingPunct="1">
+              <a:spcBef>
+                <a:spcPct val="20000"/>
+              </a:spcBef>
+              <a:buClr>
+                <a:schemeClr val="accent1"/>
+              </a:buClr>
+              <a:buFont typeface="Arial" pitchFamily="34" charset="0"/>
+              <a:buChar char="•"/>
+              <a:defRPr sz="1400" kern="1200" baseline="0">
+                <a:solidFill>
+                  <a:schemeClr val="tx1"/>
+                </a:solidFill>
+                <a:latin typeface="+mn-lt"/>
+                <a:ea typeface="+mn-ea"/>
+                <a:cs typeface="+mn-cs"/>
+              </a:defRPr>
+            </a:lvl6pPr>
+            <a:lvl7pPr marL="1920240" indent="-182880" algn="l" defTabSz="914400" rtl="0" eaLnBrk="1" latinLnBrk="0" hangingPunct="1">
+              <a:spcBef>
+                <a:spcPct val="20000"/>
+              </a:spcBef>
+              <a:buClr>
+                <a:schemeClr val="accent2"/>
+              </a:buClr>
+              <a:buFont typeface="Arial" pitchFamily="34" charset="0"/>
+              <a:buChar char="•"/>
+              <a:defRPr sz="1400" kern="1200">
+                <a:solidFill>
+                  <a:schemeClr val="tx1"/>
+                </a:solidFill>
+                <a:latin typeface="+mn-lt"/>
+                <a:ea typeface="+mn-ea"/>
+                <a:cs typeface="+mn-cs"/>
+              </a:defRPr>
+            </a:lvl7pPr>
+            <a:lvl8pPr marL="2103120" indent="-182880" algn="l" defTabSz="914400" rtl="0" eaLnBrk="1" latinLnBrk="0" hangingPunct="1">
+              <a:spcBef>
+                <a:spcPct val="20000"/>
+              </a:spcBef>
+              <a:buClr>
+                <a:schemeClr val="accent3"/>
+              </a:buClr>
+              <a:buFont typeface="Arial" pitchFamily="34" charset="0"/>
+              <a:buChar char="•"/>
+              <a:defRPr sz="1400" kern="1200">
+                <a:solidFill>
+                  <a:schemeClr val="tx1"/>
+                </a:solidFill>
+                <a:latin typeface="+mn-lt"/>
+                <a:ea typeface="+mn-ea"/>
+                <a:cs typeface="+mn-cs"/>
+              </a:defRPr>
+            </a:lvl8pPr>
+            <a:lvl9pPr marL="2286000" indent="-182880" algn="l" defTabSz="914400" rtl="0" eaLnBrk="1" latinLnBrk="0" hangingPunct="1">
+              <a:spcBef>
+                <a:spcPct val="20000"/>
+              </a:spcBef>
+              <a:buClr>
+                <a:schemeClr val="accent4"/>
+              </a:buClr>
+              <a:buFont typeface="Arial" pitchFamily="34" charset="0"/>
+              <a:buChar char="•"/>
+              <a:defRPr sz="1400" kern="1200">
+                <a:solidFill>
+                  <a:schemeClr val="tx1"/>
+                </a:solidFill>
+                <a:latin typeface="+mn-lt"/>
+                <a:ea typeface="+mn-ea"/>
+                <a:cs typeface="+mn-cs"/>
+              </a:defRPr>
+            </a:lvl9pPr>
+          </a:lstStyle>
+          <a:p>
+            <a:pPr marL="114300" indent="0">
+              <a:buNone/>
+            </a:pPr>
+            <a:r>
+              <a:rPr lang="ru-RU" dirty="0"/>
+              <a:t>Плоское или объёмное игровое поле разделено на смежные ячейки (квадраты, шестиугольники, кубы и т. п.), некоторые из которых «заминированы»; количество «заминированных» ячеек известно. Целью игры является открытие всех ячеек, не содержащих мины.</a:t>
+            </a:r>
+          </a:p>
+        </p:txBody>
+      </p:sp>
+    </p:spTree>
+    <p:extLst>
+      <p:ext uri="{BB962C8B-B14F-4D97-AF65-F5344CB8AC3E}">
+        <p14:creationId xmlns:p14="http://schemas.microsoft.com/office/powerpoint/2010/main" val="738012564"/>
+      </p:ext>
+    </p:extLst>
+  </p:cSld>
+  <p:clrMapOvr>
+    <a:masterClrMapping/>
+  </p:clrMapOvr>
+  <p:timing>
+    <p:tnLst>
+      <p:par>
+        <p:cTn id="1" dur="indefinite" restart="never" nodeType="tmRoot"/>
+      </p:par>
+    </p:tnLst>
+  </p:timing>
+</p:sld>
+</file>
+
+<file path=ppt/slides/slide6.xml><?xml version="1.0" encoding="utf-8"?>
+<p:sld xmlns:a="http://schemas.openxmlformats.org/drawingml/2006/main" xmlns:r="http://schemas.openxmlformats.org/officeDocument/2006/relationships" xmlns:p="http://schemas.openxmlformats.org/presentationml/2006/main">
+  <p:cSld>
+    <p:spTree>
+      <p:nvGrpSpPr>
+        <p:cNvPr id="1" name=""/>
+        <p:cNvGrpSpPr/>
+        <p:nvPr/>
+      </p:nvGrpSpPr>
+      <p:grpSpPr>
+        <a:xfrm>
+          <a:off x="0" y="0"/>
+          <a:ext cx="0" cy="0"/>
+          <a:chOff x="0" y="0"/>
+          <a:chExt cx="0" cy="0"/>
+        </a:xfrm>
+      </p:grpSpPr>
+      <p:sp>
+        <p:nvSpPr>
+          <p:cNvPr id="2" name="Заголовок 1"/>
+          <p:cNvSpPr>
+            <a:spLocks noGrp="1"/>
+          </p:cNvSpPr>
+          <p:nvPr>
+            <p:ph type="title"/>
+          </p:nvPr>
+        </p:nvSpPr>
+        <p:spPr>
+          <a:xfrm>
+            <a:off x="539552" y="2996952"/>
+            <a:ext cx="7620000" cy="1143000"/>
+          </a:xfrm>
+        </p:spPr>
+        <p:txBody>
+          <a:bodyPr/>
+          <a:lstStyle/>
+          <a:p>
+            <a:r>
+              <a:rPr lang="ru-RU" dirty="0" smtClean="0"/>
+              <a:t>Ну тут еще какие-то слайды нужны но я не придумал</a:t>
+            </a:r>
+            <a:br>
+              <a:rPr lang="ru-RU" dirty="0" smtClean="0"/>
+            </a:br>
+            <a:r>
+              <a:rPr lang="ru-RU" dirty="0" smtClean="0"/>
+              <a:t>или этого хватит?</a:t>
+            </a:r>
+            <a:br>
+              <a:rPr lang="ru-RU" dirty="0" smtClean="0"/>
+            </a:br>
+            <a:endParaRPr lang="ru-RU" dirty="0"/>
+          </a:p>
+        </p:txBody>
+      </p:sp>
+    </p:spTree>
+    <p:extLst>
+      <p:ext uri="{BB962C8B-B14F-4D97-AF65-F5344CB8AC3E}">
+        <p14:creationId xmlns:p14="http://schemas.microsoft.com/office/powerpoint/2010/main" val="3724149702"/>
+      </p:ext>
+    </p:extLst>
+  </p:cSld>
+  <p:clrMapOvr>
+    <a:masterClrMapping/>
+  </p:clrMapOvr>
+  <p:timing>
+    <p:tnLst>
+      <p:par>
+        <p:cTn id="1" dur="indefinite" restart="never" nodeType="tmRoot"/>
+      </p:par>
+    </p:tnLst>
+  </p:timing>
+</p:sld>
+</file>
+
+<file path=ppt/slides/slide7.xml><?xml version="1.0" encoding="utf-8"?>
+<p:sld xmlns:a="http://schemas.openxmlformats.org/drawingml/2006/main" xmlns:r="http://schemas.openxmlformats.org/officeDocument/2006/relationships" xmlns:p="http://schemas.openxmlformats.org/presentationml/2006/main">
+  <p:cSld>
+    <p:spTree>
+      <p:nvGrpSpPr>
+        <p:cNvPr id="1" name=""/>
+        <p:cNvGrpSpPr/>
+        <p:nvPr/>
+      </p:nvGrpSpPr>
+      <p:grpSpPr>
+        <a:xfrm>
+          <a:off x="0" y="0"/>
+          <a:ext cx="0" cy="0"/>
+          <a:chOff x="0" y="0"/>
+          <a:chExt cx="0" cy="0"/>
+        </a:xfrm>
+      </p:grpSpPr>
+      <p:sp>
+        <p:nvSpPr>
+          <p:cNvPr id="2" name="Заголовок 1"/>
+          <p:cNvSpPr>
+            <a:spLocks noGrp="1"/>
+          </p:cNvSpPr>
+          <p:nvPr>
+            <p:ph type="title"/>
+          </p:nvPr>
+        </p:nvSpPr>
+        <p:spPr>
+          <a:xfrm>
+            <a:off x="762000" y="2780928"/>
+            <a:ext cx="7620000" cy="1143000"/>
+          </a:xfrm>
+        </p:spPr>
+        <p:txBody>
+          <a:bodyPr/>
+          <a:lstStyle/>
+          <a:p>
+            <a:r>
+              <a:rPr lang="ru-RU" dirty="0" smtClean="0"/>
+              <a:t>Спасибо за внимание ! :</a:t>
+            </a:r>
+            <a:r>
+              <a:rPr lang="en-US" dirty="0" smtClean="0"/>
+              <a:t>D</a:t>
+            </a:r>
+            <a:endParaRPr lang="ru-RU" dirty="0"/>
+          </a:p>
+        </p:txBody>
+      </p:sp>
+    </p:spTree>
+    <p:extLst>
+      <p:ext uri="{BB962C8B-B14F-4D97-AF65-F5344CB8AC3E}">
+        <p14:creationId xmlns:p14="http://schemas.microsoft.com/office/powerpoint/2010/main" val="453743651"/>
+      </p:ext>
+    </p:extLst>
+  </p:cSld>
+  <p:clrMapOvr>
+    <a:masterClrMapping/>
+  </p:clrMapOvr>
+  <p:timing>
+    <p:tnLst>
+      <p:par>
+        <p:cTn id="1" dur="indefinite" restart="never" nodeType="tmRoot"/>
+      </p:par>
+    </p:tnLst>
+  </p:timing>
+</p:sld>
+</file>
+
 <file path=ppt/theme/theme1.xml><?xml version="1.0" encoding="utf-8"?>
-<a:theme xmlns:a="http://schemas.openxmlformats.org/drawingml/2006/main" name="Тема Office">
+<a:theme xmlns:a="http://schemas.openxmlformats.org/drawingml/2006/main" name="Соседство">
   <a:themeElements>
-    <a:clrScheme name="Стандартная">
+    <a:clrScheme name="Серая">
       <a:dk1>
         <a:sysClr val="windowText" lastClr="000000"/>
       </a:dk1>
@@ -3026,42 +4075,42 @@
         <a:sysClr val="window" lastClr="FFFFFF"/>
       </a:lt1>
       <a:dk2>
-        <a:srgbClr val="1F497D"/>
+        <a:srgbClr val="000000"/>
       </a:dk2>
       <a:lt2>
-        <a:srgbClr val="EEECE1"/>
+        <a:srgbClr val="F8F8F8"/>
       </a:lt2>
       <a:accent1>
-        <a:srgbClr val="4F81BD"/>
+        <a:srgbClr val="DDDDDD"/>
       </a:accent1>
       <a:accent2>
-        <a:srgbClr val="C0504D"/>
+        <a:srgbClr val="B2B2B2"/>
       </a:accent2>
       <a:accent3>
-        <a:srgbClr val="9BBB59"/>
+        <a:srgbClr val="969696"/>
       </a:accent3>
       <a:accent4>
-        <a:srgbClr val="8064A2"/>
+        <a:srgbClr val="808080"/>
       </a:accent4>
       <a:accent5>
-        <a:srgbClr val="4BACC6"/>
+        <a:srgbClr val="5F5F5F"/>
       </a:accent5>
       <a:accent6>
-        <a:srgbClr val="F79646"/>
+        <a:srgbClr val="4D4D4D"/>
       </a:accent6>
       <a:hlink>
-        <a:srgbClr val="0000FF"/>
+        <a:srgbClr val="5F5F5F"/>
       </a:hlink>
       <a:folHlink>
-        <a:srgbClr val="800080"/>
+        <a:srgbClr val="919191"/>
       </a:folHlink>
     </a:clrScheme>
     <a:fontScheme name="Стандартная">
       <a:majorFont>
-        <a:latin typeface="Calibri"/>
+        <a:latin typeface="Cambria"/>
         <a:ea typeface=""/>
         <a:cs typeface=""/>
-        <a:font script="Jpan" typeface="ＭＳ Ｐゴシック"/>
+        <a:font script="Jpan" typeface="ＭＳ ゴシック"/>
         <a:font script="Hang" typeface="맑은 고딕"/>
         <a:font script="Hans" typeface="宋体"/>
         <a:font script="Hant" typeface="新細明體"/>
@@ -3090,12 +4139,13 @@
         <a:font script="Mong" typeface="Mongolian Baiti"/>
         <a:font script="Viet" typeface="Times New Roman"/>
         <a:font script="Uigh" typeface="Microsoft Uighur"/>
+        <a:font script="Geor" typeface="Sylfaen"/>
       </a:majorFont>
       <a:minorFont>
         <a:latin typeface="Calibri"/>
         <a:ea typeface=""/>
         <a:cs typeface=""/>
-        <a:font script="Jpan" typeface="ＭＳ Ｐゴシック"/>
+        <a:font script="Jpan" typeface="ＭＳ 明朝"/>
         <a:font script="Hang" typeface="맑은 고딕"/>
         <a:font script="Hans" typeface="宋体"/>
         <a:font script="Hant" typeface="新細明體"/>
@@ -3124,62 +4174,25 @@
         <a:font script="Mong" typeface="Mongolian Baiti"/>
         <a:font script="Viet" typeface="Arial"/>
         <a:font script="Uigh" typeface="Microsoft Uighur"/>
+        <a:font script="Geor" typeface="Sylfaen"/>
       </a:minorFont>
     </a:fontScheme>
-    <a:fmtScheme name="Стандартная">
+    <a:fmtScheme name="Соседство">
       <a:fillStyleLst>
         <a:solidFill>
           <a:schemeClr val="phClr"/>
         </a:solidFill>
-        <a:gradFill rotWithShape="1">
-          <a:gsLst>
-            <a:gs pos="0">
-              <a:schemeClr val="phClr">
-                <a:tint val="50000"/>
-                <a:satMod val="300000"/>
-              </a:schemeClr>
-            </a:gs>
-            <a:gs pos="35000">
-              <a:schemeClr val="phClr">
-                <a:tint val="37000"/>
-                <a:satMod val="300000"/>
-              </a:schemeClr>
-            </a:gs>
-            <a:gs pos="100000">
-              <a:schemeClr val="phClr">
-                <a:tint val="15000"/>
-                <a:satMod val="350000"/>
-              </a:schemeClr>
-            </a:gs>
-          </a:gsLst>
-          <a:lin ang="16200000" scaled="1"/>
-        </a:gradFill>
-        <a:gradFill rotWithShape="1">
-          <a:gsLst>
-            <a:gs pos="0">
-              <a:schemeClr val="phClr">
-                <a:shade val="51000"/>
-                <a:satMod val="130000"/>
-              </a:schemeClr>
-            </a:gs>
-            <a:gs pos="80000">
-              <a:schemeClr val="phClr">
-                <a:shade val="93000"/>
-                <a:satMod val="130000"/>
-              </a:schemeClr>
-            </a:gs>
-            <a:gs pos="100000">
-              <a:schemeClr val="phClr">
-                <a:shade val="94000"/>
-                <a:satMod val="135000"/>
-              </a:schemeClr>
-            </a:gs>
-          </a:gsLst>
-          <a:lin ang="16200000" scaled="0"/>
-        </a:gradFill>
+        <a:solidFill>
+          <a:schemeClr val="phClr">
+            <a:tint val="55000"/>
+          </a:schemeClr>
+        </a:solidFill>
+        <a:solidFill>
+          <a:schemeClr val="phClr"/>
+        </a:solidFill>
       </a:fillStyleLst>
       <a:lnStyleLst>
-        <a:ln w="9525" cap="flat" cmpd="sng" algn="ctr">
+        <a:ln w="12700" cap="flat" cmpd="sng" algn="ctr">
           <a:solidFill>
             <a:schemeClr val="phClr">
               <a:shade val="95000"/>
@@ -3203,41 +4216,35 @@
       </a:lnStyleLst>
       <a:effectStyleLst>
         <a:effectStyle>
+          <a:effectLst/>
+        </a:effectStyle>
+        <a:effectStyle>
           <a:effectLst>
-            <a:outerShdw blurRad="40000" dist="20000" dir="5400000" rotWithShape="0">
+            <a:outerShdw blurRad="50800" dist="25400" algn="bl" rotWithShape="0">
               <a:srgbClr val="000000">
-                <a:alpha val="38000"/>
+                <a:alpha val="60000"/>
               </a:srgbClr>
             </a:outerShdw>
           </a:effectLst>
         </a:effectStyle>
         <a:effectStyle>
-          <a:effectLst>
-            <a:outerShdw blurRad="40000" dist="23000" dir="5400000" rotWithShape="0">
-              <a:srgbClr val="000000">
-                <a:alpha val="35000"/>
-              </a:srgbClr>
-            </a:outerShdw>
-          </a:effectLst>
-        </a:effectStyle>
-        <a:effectStyle>
-          <a:effectLst>
-            <a:outerShdw blurRad="40000" dist="23000" dir="5400000" rotWithShape="0">
-              <a:srgbClr val="000000">
-                <a:alpha val="35000"/>
-              </a:srgbClr>
-            </a:outerShdw>
-          </a:effectLst>
+          <a:effectLst/>
           <a:scene3d>
             <a:camera prst="orthographicFront">
               <a:rot lat="0" lon="0" rev="0"/>
             </a:camera>
-            <a:lightRig rig="threePt" dir="t">
-              <a:rot lat="0" lon="0" rev="1200000"/>
+            <a:lightRig rig="brightRoom" dir="tl">
+              <a:rot lat="0" lon="0" rev="1800000"/>
             </a:lightRig>
           </a:scene3d>
-          <a:sp3d>
-            <a:bevelT w="63500" h="25400"/>
+          <a:sp3d contourW="10160" prstMaterial="dkEdge">
+            <a:bevelT w="38100" h="50800" prst="angle"/>
+            <a:contourClr>
+              <a:schemeClr val="phClr">
+                <a:shade val="40000"/>
+                <a:satMod val="150000"/>
+              </a:schemeClr>
+            </a:contourClr>
           </a:sp3d>
         </a:effectStyle>
       </a:effectStyleLst>
@@ -3249,47 +4256,39 @@
           <a:gsLst>
             <a:gs pos="0">
               <a:schemeClr val="phClr">
-                <a:tint val="40000"/>
-                <a:satMod val="350000"/>
+                <a:tint val="90000"/>
               </a:schemeClr>
             </a:gs>
-            <a:gs pos="40000">
+            <a:gs pos="75000">
               <a:schemeClr val="phClr">
-                <a:tint val="45000"/>
-                <a:shade val="99000"/>
-                <a:satMod val="350000"/>
+                <a:shade val="100000"/>
+                <a:satMod val="115000"/>
               </a:schemeClr>
             </a:gs>
             <a:gs pos="100000">
               <a:schemeClr val="phClr">
-                <a:shade val="20000"/>
-                <a:satMod val="255000"/>
+                <a:shade val="70000"/>
+                <a:satMod val="130000"/>
               </a:schemeClr>
             </a:gs>
           </a:gsLst>
           <a:path path="circle">
-            <a:fillToRect l="50000" t="-80000" r="50000" b="180000"/>
+            <a:fillToRect l="20000" t="50000" r="100000" b="50000"/>
           </a:path>
         </a:gradFill>
-        <a:gradFill rotWithShape="1">
-          <a:gsLst>
-            <a:gs pos="0">
+        <a:blipFill rotWithShape="1">
+          <a:blip xmlns:r="http://schemas.openxmlformats.org/officeDocument/2006/relationships" r:embed="rId1">
+            <a:duotone>
               <a:schemeClr val="phClr">
-                <a:tint val="80000"/>
-                <a:satMod val="300000"/>
+                <a:tint val="97000"/>
               </a:schemeClr>
-            </a:gs>
-            <a:gs pos="100000">
               <a:schemeClr val="phClr">
-                <a:shade val="30000"/>
-                <a:satMod val="200000"/>
+                <a:shade val="96000"/>
               </a:schemeClr>
-            </a:gs>
-          </a:gsLst>
-          <a:path path="circle">
-            <a:fillToRect l="50000" t="50000" r="50000" b="50000"/>
-          </a:path>
-        </a:gradFill>
+            </a:duotone>
+          </a:blip>
+          <a:tile tx="0" ty="0" sx="32000" sy="32000" flip="none" algn="tl"/>
+        </a:blipFill>
       </a:bgFillStyleLst>
     </a:fmtScheme>
   </a:themeElements>

</xml_diff>